<commit_message>
powerpoint work, notification work, server work
</commit_message>
<xml_diff>
--- a/documents/PresentationFinal.pptx
+++ b/documents/PresentationFinal.pptx
@@ -1,14 +1,52 @@
 
 <file path=ppt/presentation.xml><?xml version="1.0" encoding="utf-8"?>
-<p:presentation xmlns:a="http://schemas.openxmlformats.org/drawingml/2006/main" xmlns:r="http://schemas.openxmlformats.org/officeDocument/2006/relationships" xmlns:p="http://schemas.openxmlformats.org/presentationml/2006/main" saveSubsetFonts="1">
+<p:presentation xmlns:a="http://schemas.openxmlformats.org/drawingml/2006/main" xmlns:r="http://schemas.openxmlformats.org/officeDocument/2006/relationships" xmlns:p="http://schemas.openxmlformats.org/presentationml/2006/main" embedTrueTypeFonts="1">
   <p:sldMasterIdLst>
-    <p:sldMasterId id="2147483648" r:id="rId1"/>
+    <p:sldMasterId id="2147483672" r:id="rId1"/>
   </p:sldMasterIdLst>
+  <p:notesMasterIdLst>
+    <p:notesMasterId r:id="rId7"/>
+  </p:notesMasterIdLst>
   <p:sldIdLst>
     <p:sldId id="256" r:id="rId2"/>
+    <p:sldId id="257" r:id="rId3"/>
+    <p:sldId id="260" r:id="rId4"/>
+    <p:sldId id="258" r:id="rId5"/>
+    <p:sldId id="259" r:id="rId6"/>
   </p:sldIdLst>
   <p:sldSz cx="9144000" cy="6858000" type="screen4x3"/>
   <p:notesSz cx="6858000" cy="9144000"/>
+  <p:embeddedFontLst>
+    <p:embeddedFont>
+      <p:font typeface="Roboto" pitchFamily="2" charset="0"/>
+      <p:regular r:id="rId8"/>
+      <p:bold r:id="rId9"/>
+      <p:italic r:id="rId10"/>
+      <p:boldItalic r:id="rId11"/>
+    </p:embeddedFont>
+    <p:embeddedFont>
+      <p:font typeface="Calibri" pitchFamily="34" charset="0"/>
+      <p:regular r:id="rId12"/>
+      <p:bold r:id="rId13"/>
+      <p:italic r:id="rId14"/>
+      <p:boldItalic r:id="rId15"/>
+    </p:embeddedFont>
+    <p:embeddedFont>
+      <p:font typeface="Roboto Lt" pitchFamily="2" charset="0"/>
+      <p:regular r:id="rId16"/>
+      <p:italic r:id="rId17"/>
+    </p:embeddedFont>
+    <p:embeddedFont>
+      <p:font typeface="Droid Sans" pitchFamily="34" charset="0"/>
+      <p:regular r:id="rId18"/>
+      <p:bold r:id="rId19"/>
+    </p:embeddedFont>
+    <p:embeddedFont>
+      <p:font typeface="Roboto Bk" pitchFamily="2" charset="0"/>
+      <p:regular r:id="rId20"/>
+      <p:italic r:id="rId21"/>
+    </p:embeddedFont>
+  </p:embeddedFontLst>
   <p:defaultTextStyle>
     <a:defPPr>
       <a:defRPr lang="en-US"/>
@@ -107,6 +145,356 @@
 </p:presentation>
 </file>
 
+<file path=ppt/notesMasters/notesMaster1.xml><?xml version="1.0" encoding="utf-8"?>
+<p:notesMaster xmlns:a="http://schemas.openxmlformats.org/drawingml/2006/main" xmlns:r="http://schemas.openxmlformats.org/officeDocument/2006/relationships" xmlns:p="http://schemas.openxmlformats.org/presentationml/2006/main">
+  <p:cSld>
+    <p:bg>
+      <p:bgRef idx="1001">
+        <a:schemeClr val="bg1"/>
+      </p:bgRef>
+    </p:bg>
+    <p:spTree>
+      <p:nvGrpSpPr>
+        <p:cNvPr id="1" name=""/>
+        <p:cNvGrpSpPr/>
+        <p:nvPr/>
+      </p:nvGrpSpPr>
+      <p:grpSpPr>
+        <a:xfrm>
+          <a:off x="0" y="0"/>
+          <a:ext cx="0" cy="0"/>
+          <a:chOff x="0" y="0"/>
+          <a:chExt cx="0" cy="0"/>
+        </a:xfrm>
+      </p:grpSpPr>
+      <p:sp>
+        <p:nvSpPr>
+          <p:cNvPr id="2" name="Header Placeholder 1"/>
+          <p:cNvSpPr>
+            <a:spLocks noGrp="1"/>
+          </p:cNvSpPr>
+          <p:nvPr>
+            <p:ph type="hdr" sz="quarter"/>
+          </p:nvPr>
+        </p:nvSpPr>
+        <p:spPr>
+          <a:xfrm>
+            <a:off x="0" y="0"/>
+            <a:ext cx="2971800" cy="457200"/>
+          </a:xfrm>
+          <a:prstGeom prst="rect">
+            <a:avLst/>
+          </a:prstGeom>
+        </p:spPr>
+        <p:txBody>
+          <a:bodyPr vert="horz" lIns="91440" tIns="45720" rIns="91440" bIns="45720" rtlCol="0"/>
+          <a:lstStyle>
+            <a:lvl1pPr algn="l">
+              <a:defRPr sz="1200"/>
+            </a:lvl1pPr>
+          </a:lstStyle>
+          <a:p>
+            <a:endParaRPr lang="en-US"/>
+          </a:p>
+        </p:txBody>
+      </p:sp>
+      <p:sp>
+        <p:nvSpPr>
+          <p:cNvPr id="3" name="Date Placeholder 2"/>
+          <p:cNvSpPr>
+            <a:spLocks noGrp="1"/>
+          </p:cNvSpPr>
+          <p:nvPr>
+            <p:ph type="dt" idx="1"/>
+          </p:nvPr>
+        </p:nvSpPr>
+        <p:spPr>
+          <a:xfrm>
+            <a:off x="3884613" y="0"/>
+            <a:ext cx="2971800" cy="457200"/>
+          </a:xfrm>
+          <a:prstGeom prst="rect">
+            <a:avLst/>
+          </a:prstGeom>
+        </p:spPr>
+        <p:txBody>
+          <a:bodyPr vert="horz" lIns="91440" tIns="45720" rIns="91440" bIns="45720" rtlCol="0"/>
+          <a:lstStyle>
+            <a:lvl1pPr algn="r">
+              <a:defRPr sz="1200"/>
+            </a:lvl1pPr>
+          </a:lstStyle>
+          <a:p>
+            <a:fld id="{07312A5F-3CD2-472C-BD74-891BE0A222A8}" type="datetimeFigureOut">
+              <a:rPr lang="en-US" smtClean="0"/>
+              <a:t>11/18/2012</a:t>
+            </a:fld>
+            <a:endParaRPr lang="en-US"/>
+          </a:p>
+        </p:txBody>
+      </p:sp>
+      <p:sp>
+        <p:nvSpPr>
+          <p:cNvPr id="4" name="Slide Image Placeholder 3"/>
+          <p:cNvSpPr>
+            <a:spLocks noGrp="1" noRot="1" noChangeAspect="1"/>
+          </p:cNvSpPr>
+          <p:nvPr>
+            <p:ph type="sldImg" idx="2"/>
+          </p:nvPr>
+        </p:nvSpPr>
+        <p:spPr>
+          <a:xfrm>
+            <a:off x="1143000" y="685800"/>
+            <a:ext cx="4572000" cy="3429000"/>
+          </a:xfrm>
+          <a:prstGeom prst="rect">
+            <a:avLst/>
+          </a:prstGeom>
+          <a:noFill/>
+          <a:ln w="12700">
+            <a:solidFill>
+              <a:prstClr val="black"/>
+            </a:solidFill>
+          </a:ln>
+        </p:spPr>
+        <p:txBody>
+          <a:bodyPr vert="horz" lIns="91440" tIns="45720" rIns="91440" bIns="45720" rtlCol="0" anchor="ctr"/>
+          <a:lstStyle/>
+          <a:p>
+            <a:endParaRPr lang="en-US"/>
+          </a:p>
+        </p:txBody>
+      </p:sp>
+      <p:sp>
+        <p:nvSpPr>
+          <p:cNvPr id="5" name="Notes Placeholder 4"/>
+          <p:cNvSpPr>
+            <a:spLocks noGrp="1"/>
+          </p:cNvSpPr>
+          <p:nvPr>
+            <p:ph type="body" sz="quarter" idx="3"/>
+          </p:nvPr>
+        </p:nvSpPr>
+        <p:spPr>
+          <a:xfrm>
+            <a:off x="685800" y="4343400"/>
+            <a:ext cx="5486400" cy="4114800"/>
+          </a:xfrm>
+          <a:prstGeom prst="rect">
+            <a:avLst/>
+          </a:prstGeom>
+        </p:spPr>
+        <p:txBody>
+          <a:bodyPr vert="horz" lIns="91440" tIns="45720" rIns="91440" bIns="45720" rtlCol="0"/>
+          <a:lstStyle/>
+          <a:p>
+            <a:pPr lvl="0"/>
+            <a:r>
+              <a:rPr lang="en-US" smtClean="0"/>
+              <a:t>Click to edit Master text styles</a:t>
+            </a:r>
+          </a:p>
+          <a:p>
+            <a:pPr lvl="1"/>
+            <a:r>
+              <a:rPr lang="en-US" smtClean="0"/>
+              <a:t>Second level</a:t>
+            </a:r>
+          </a:p>
+          <a:p>
+            <a:pPr lvl="2"/>
+            <a:r>
+              <a:rPr lang="en-US" smtClean="0"/>
+              <a:t>Third level</a:t>
+            </a:r>
+          </a:p>
+          <a:p>
+            <a:pPr lvl="3"/>
+            <a:r>
+              <a:rPr lang="en-US" smtClean="0"/>
+              <a:t>Fourth level</a:t>
+            </a:r>
+          </a:p>
+          <a:p>
+            <a:pPr lvl="4"/>
+            <a:r>
+              <a:rPr lang="en-US" smtClean="0"/>
+              <a:t>Fifth level</a:t>
+            </a:r>
+            <a:endParaRPr lang="en-US"/>
+          </a:p>
+        </p:txBody>
+      </p:sp>
+      <p:sp>
+        <p:nvSpPr>
+          <p:cNvPr id="6" name="Footer Placeholder 5"/>
+          <p:cNvSpPr>
+            <a:spLocks noGrp="1"/>
+          </p:cNvSpPr>
+          <p:nvPr>
+            <p:ph type="ftr" sz="quarter" idx="4"/>
+          </p:nvPr>
+        </p:nvSpPr>
+        <p:spPr>
+          <a:xfrm>
+            <a:off x="0" y="8685213"/>
+            <a:ext cx="2971800" cy="457200"/>
+          </a:xfrm>
+          <a:prstGeom prst="rect">
+            <a:avLst/>
+          </a:prstGeom>
+        </p:spPr>
+        <p:txBody>
+          <a:bodyPr vert="horz" lIns="91440" tIns="45720" rIns="91440" bIns="45720" rtlCol="0" anchor="b"/>
+          <a:lstStyle>
+            <a:lvl1pPr algn="l">
+              <a:defRPr sz="1200"/>
+            </a:lvl1pPr>
+          </a:lstStyle>
+          <a:p>
+            <a:endParaRPr lang="en-US"/>
+          </a:p>
+        </p:txBody>
+      </p:sp>
+      <p:sp>
+        <p:nvSpPr>
+          <p:cNvPr id="7" name="Slide Number Placeholder 6"/>
+          <p:cNvSpPr>
+            <a:spLocks noGrp="1"/>
+          </p:cNvSpPr>
+          <p:nvPr>
+            <p:ph type="sldNum" sz="quarter" idx="5"/>
+          </p:nvPr>
+        </p:nvSpPr>
+        <p:spPr>
+          <a:xfrm>
+            <a:off x="3884613" y="8685213"/>
+            <a:ext cx="2971800" cy="457200"/>
+          </a:xfrm>
+          <a:prstGeom prst="rect">
+            <a:avLst/>
+          </a:prstGeom>
+        </p:spPr>
+        <p:txBody>
+          <a:bodyPr vert="horz" lIns="91440" tIns="45720" rIns="91440" bIns="45720" rtlCol="0" anchor="b"/>
+          <a:lstStyle>
+            <a:lvl1pPr algn="r">
+              <a:defRPr sz="1200"/>
+            </a:lvl1pPr>
+          </a:lstStyle>
+          <a:p>
+            <a:fld id="{80A87E50-1048-4DEC-8289-A4BAEA3B06A1}" type="slidenum">
+              <a:rPr lang="en-US" smtClean="0"/>
+              <a:t>‹#›</a:t>
+            </a:fld>
+            <a:endParaRPr lang="en-US"/>
+          </a:p>
+        </p:txBody>
+      </p:sp>
+    </p:spTree>
+    <p:extLst>
+      <p:ext uri="{BB962C8B-B14F-4D97-AF65-F5344CB8AC3E}">
+        <p14:creationId xmlns:p14="http://schemas.microsoft.com/office/powerpoint/2010/main" val="3907406988"/>
+      </p:ext>
+    </p:extLst>
+  </p:cSld>
+  <p:clrMap bg1="lt1" tx1="dk1" bg2="lt2" tx2="dk2" accent1="accent1" accent2="accent2" accent3="accent3" accent4="accent4" accent5="accent5" accent6="accent6" hlink="hlink" folHlink="folHlink"/>
+  <p:notesStyle>
+    <a:lvl1pPr marL="0" algn="l" defTabSz="914400" rtl="0" eaLnBrk="1" latinLnBrk="0" hangingPunct="1">
+      <a:defRPr sz="1200" kern="1200">
+        <a:solidFill>
+          <a:schemeClr val="tx1"/>
+        </a:solidFill>
+        <a:latin typeface="+mn-lt"/>
+        <a:ea typeface="+mn-ea"/>
+        <a:cs typeface="+mn-cs"/>
+      </a:defRPr>
+    </a:lvl1pPr>
+    <a:lvl2pPr marL="457200" algn="l" defTabSz="914400" rtl="0" eaLnBrk="1" latinLnBrk="0" hangingPunct="1">
+      <a:defRPr sz="1200" kern="1200">
+        <a:solidFill>
+          <a:schemeClr val="tx1"/>
+        </a:solidFill>
+        <a:latin typeface="+mn-lt"/>
+        <a:ea typeface="+mn-ea"/>
+        <a:cs typeface="+mn-cs"/>
+      </a:defRPr>
+    </a:lvl2pPr>
+    <a:lvl3pPr marL="914400" algn="l" defTabSz="914400" rtl="0" eaLnBrk="1" latinLnBrk="0" hangingPunct="1">
+      <a:defRPr sz="1200" kern="1200">
+        <a:solidFill>
+          <a:schemeClr val="tx1"/>
+        </a:solidFill>
+        <a:latin typeface="+mn-lt"/>
+        <a:ea typeface="+mn-ea"/>
+        <a:cs typeface="+mn-cs"/>
+      </a:defRPr>
+    </a:lvl3pPr>
+    <a:lvl4pPr marL="1371600" algn="l" defTabSz="914400" rtl="0" eaLnBrk="1" latinLnBrk="0" hangingPunct="1">
+      <a:defRPr sz="1200" kern="1200">
+        <a:solidFill>
+          <a:schemeClr val="tx1"/>
+        </a:solidFill>
+        <a:latin typeface="+mn-lt"/>
+        <a:ea typeface="+mn-ea"/>
+        <a:cs typeface="+mn-cs"/>
+      </a:defRPr>
+    </a:lvl4pPr>
+    <a:lvl5pPr marL="1828800" algn="l" defTabSz="914400" rtl="0" eaLnBrk="1" latinLnBrk="0" hangingPunct="1">
+      <a:defRPr sz="1200" kern="1200">
+        <a:solidFill>
+          <a:schemeClr val="tx1"/>
+        </a:solidFill>
+        <a:latin typeface="+mn-lt"/>
+        <a:ea typeface="+mn-ea"/>
+        <a:cs typeface="+mn-cs"/>
+      </a:defRPr>
+    </a:lvl5pPr>
+    <a:lvl6pPr marL="2286000" algn="l" defTabSz="914400" rtl="0" eaLnBrk="1" latinLnBrk="0" hangingPunct="1">
+      <a:defRPr sz="1200" kern="1200">
+        <a:solidFill>
+          <a:schemeClr val="tx1"/>
+        </a:solidFill>
+        <a:latin typeface="+mn-lt"/>
+        <a:ea typeface="+mn-ea"/>
+        <a:cs typeface="+mn-cs"/>
+      </a:defRPr>
+    </a:lvl6pPr>
+    <a:lvl7pPr marL="2743200" algn="l" defTabSz="914400" rtl="0" eaLnBrk="1" latinLnBrk="0" hangingPunct="1">
+      <a:defRPr sz="1200" kern="1200">
+        <a:solidFill>
+          <a:schemeClr val="tx1"/>
+        </a:solidFill>
+        <a:latin typeface="+mn-lt"/>
+        <a:ea typeface="+mn-ea"/>
+        <a:cs typeface="+mn-cs"/>
+      </a:defRPr>
+    </a:lvl7pPr>
+    <a:lvl8pPr marL="3200400" algn="l" defTabSz="914400" rtl="0" eaLnBrk="1" latinLnBrk="0" hangingPunct="1">
+      <a:defRPr sz="1200" kern="1200">
+        <a:solidFill>
+          <a:schemeClr val="tx1"/>
+        </a:solidFill>
+        <a:latin typeface="+mn-lt"/>
+        <a:ea typeface="+mn-ea"/>
+        <a:cs typeface="+mn-cs"/>
+      </a:defRPr>
+    </a:lvl8pPr>
+    <a:lvl9pPr marL="3657600" algn="l" defTabSz="914400" rtl="0" eaLnBrk="1" latinLnBrk="0" hangingPunct="1">
+      <a:defRPr sz="1200" kern="1200">
+        <a:solidFill>
+          <a:schemeClr val="tx1"/>
+        </a:solidFill>
+        <a:latin typeface="+mn-lt"/>
+        <a:ea typeface="+mn-ea"/>
+        <a:cs typeface="+mn-cs"/>
+      </a:defRPr>
+    </a:lvl9pPr>
+  </p:notesStyle>
+</p:notesMaster>
+</file>
+
 <file path=ppt/slideLayouts/slideLayout1.xml><?xml version="1.0" encoding="utf-8"?>
 <p:sldLayout xmlns:a="http://schemas.openxmlformats.org/drawingml/2006/main" xmlns:r="http://schemas.openxmlformats.org/officeDocument/2006/relationships" xmlns:p="http://schemas.openxmlformats.org/presentationml/2006/main" type="title" preserve="1">
   <p:cSld name="Title Slide">
@@ -136,19 +524,53 @@
         </p:nvSpPr>
         <p:spPr>
           <a:xfrm>
-            <a:off x="685800" y="2130425"/>
-            <a:ext cx="7772400" cy="1470025"/>
+            <a:off x="-76200" y="2130426"/>
+            <a:ext cx="9296400" cy="1470025"/>
           </a:xfrm>
+          <a:blipFill dpi="0" rotWithShape="1">
+            <a:blip r:embed="rId2"/>
+            <a:srcRect/>
+            <a:tile tx="0" ty="0" sx="100000" sy="100000" flip="none" algn="tl"/>
+          </a:blipFill>
+          <a:effectLst>
+            <a:glow rad="101600">
+              <a:srgbClr val="8A9AA1">
+                <a:alpha val="52000"/>
+              </a:srgbClr>
+            </a:glow>
+            <a:innerShdw blurRad="406400">
+              <a:prstClr val="black"/>
+            </a:innerShdw>
+          </a:effectLst>
         </p:spPr>
         <p:txBody>
-          <a:bodyPr/>
-          <a:lstStyle/>
-          <a:p>
-            <a:r>
-              <a:rPr lang="en-US" smtClean="0"/>
+          <a:bodyPr>
+            <a:noAutofit/>
+          </a:bodyPr>
+          <a:lstStyle>
+            <a:lvl1pPr>
+              <a:defRPr sz="6000" b="0" i="0" strike="noStrike" cap="none" spc="-150" normalizeH="0" baseline="0">
+                <a:solidFill>
+                  <a:schemeClr val="bg1"/>
+                </a:solidFill>
+                <a:effectLst>
+                  <a:outerShdw blurRad="38100" dist="38100" dir="2700000" algn="tl">
+                    <a:srgbClr val="000000">
+                      <a:alpha val="43137"/>
+                    </a:srgbClr>
+                  </a:outerShdw>
+                </a:effectLst>
+                <a:latin typeface="Roboto Bk" pitchFamily="2" charset="0"/>
+                <a:ea typeface="Roboto Bk" pitchFamily="2" charset="0"/>
+              </a:defRPr>
+            </a:lvl1pPr>
+          </a:lstStyle>
+          <a:p>
+            <a:r>
+              <a:rPr lang="en-US" dirty="0" smtClean="0"/>
               <a:t>Click to edit Master title style</a:t>
             </a:r>
-            <a:endParaRPr lang="en-US"/>
+            <a:endParaRPr lang="en-US" dirty="0"/>
           </a:p>
         </p:txBody>
       </p:sp>
@@ -175,10 +597,10 @@
               <a:buNone/>
               <a:defRPr>
                 <a:solidFill>
-                  <a:schemeClr val="tx1">
-                    <a:tint val="75000"/>
-                  </a:schemeClr>
+                  <a:srgbClr val="8A9AA1"/>
                 </a:solidFill>
+                <a:latin typeface="Roboto Lt" pitchFamily="2" charset="0"/>
+                <a:ea typeface="Roboto Lt" pitchFamily="2" charset="0"/>
               </a:defRPr>
             </a:lvl1pPr>
             <a:lvl2pPr marL="457200" indent="0" algn="ctr">
@@ -267,7 +689,7 @@
               <a:rPr lang="en-US" smtClean="0"/>
               <a:t>Click to edit Master subtitle style</a:t>
             </a:r>
-            <a:endParaRPr lang="en-US"/>
+            <a:endParaRPr lang="en-US" dirty="0"/>
           </a:p>
         </p:txBody>
       </p:sp>
@@ -286,9 +708,10 @@
           <a:bodyPr/>
           <a:lstStyle/>
           <a:p>
-            <a:fld id="{532E3D2B-DE49-4F26-AD30-F1E36EDC6A10}" type="datetimeFigureOut">
-              <a:rPr lang="en-US" smtClean="0"/>
-              <a:t>9/9/2012</a:t>
+            <a:fld id="{2F5BB042-2B17-413A-8BB2-6FDBD0381532}" type="datetimeFigureOut">
+              <a:rPr lang="en-US" smtClean="0"/>
+              <a:pPr/>
+              <a:t>11/18/2012</a:t>
             </a:fld>
             <a:endParaRPr lang="en-US"/>
           </a:p>
@@ -328,8 +751,9 @@
           <a:bodyPr/>
           <a:lstStyle/>
           <a:p>
-            <a:fld id="{35144028-314A-4539-B140-0625171852C6}" type="slidenum">
-              <a:rPr lang="en-US" smtClean="0"/>
+            <a:fld id="{F130C7C2-E2F1-465B-8C07-FB00D7F0D149}" type="slidenum">
+              <a:rPr lang="en-US" smtClean="0"/>
+              <a:pPr/>
               <a:t>‹#›</a:t>
             </a:fld>
             <a:endParaRPr lang="en-US"/>
@@ -339,13 +763,32 @@
     </p:spTree>
     <p:extLst>
       <p:ext uri="{BB962C8B-B14F-4D97-AF65-F5344CB8AC3E}">
-        <p14:creationId xmlns:p14="http://schemas.microsoft.com/office/powerpoint/2010/main" val="3891951422"/>
+        <p14:creationId xmlns:p14="http://schemas.microsoft.com/office/powerpoint/2010/main" val="1098947571"/>
       </p:ext>
     </p:extLst>
   </p:cSld>
   <p:clrMapOvr>
     <a:masterClrMapping/>
   </p:clrMapOvr>
+  <mc:AlternateContent xmlns:mc="http://schemas.openxmlformats.org/markup-compatibility/2006" xmlns:p14="http://schemas.microsoft.com/office/powerpoint/2010/main">
+    <mc:Choice Requires="p14">
+      <p:transition p14:dur="60">
+        <p:fade/>
+      </p:transition>
+    </mc:Choice>
+    <mc:Fallback xmlns="">
+      <p:transition>
+        <p:fade/>
+      </p:transition>
+    </mc:Fallback>
+  </mc:AlternateContent>
+  <p:timing>
+    <p:tnLst>
+      <p:par>
+        <p:cTn id="1" dur="indefinite" restart="never" nodeType="tmRoot"/>
+      </p:par>
+    </p:tnLst>
+  </p:timing>
 </p:sldLayout>
 </file>
 
@@ -456,9 +899,9 @@
           <a:bodyPr/>
           <a:lstStyle/>
           <a:p>
-            <a:fld id="{532E3D2B-DE49-4F26-AD30-F1E36EDC6A10}" type="datetimeFigureOut">
-              <a:rPr lang="en-US" smtClean="0"/>
-              <a:t>9/9/2012</a:t>
+            <a:fld id="{2F5BB042-2B17-413A-8BB2-6FDBD0381532}" type="datetimeFigureOut">
+              <a:rPr lang="en-US" smtClean="0"/>
+              <a:t>11/18/2012</a:t>
             </a:fld>
             <a:endParaRPr lang="en-US"/>
           </a:p>
@@ -498,7 +941,7 @@
           <a:bodyPr/>
           <a:lstStyle/>
           <a:p>
-            <a:fld id="{35144028-314A-4539-B140-0625171852C6}" type="slidenum">
+            <a:fld id="{F130C7C2-E2F1-465B-8C07-FB00D7F0D149}" type="slidenum">
               <a:rPr lang="en-US" smtClean="0"/>
               <a:t>‹#›</a:t>
             </a:fld>
@@ -509,13 +952,32 @@
     </p:spTree>
     <p:extLst>
       <p:ext uri="{BB962C8B-B14F-4D97-AF65-F5344CB8AC3E}">
-        <p14:creationId xmlns:p14="http://schemas.microsoft.com/office/powerpoint/2010/main" val="1030282448"/>
+        <p14:creationId xmlns:p14="http://schemas.microsoft.com/office/powerpoint/2010/main" val="3768190624"/>
       </p:ext>
     </p:extLst>
   </p:cSld>
   <p:clrMapOvr>
     <a:masterClrMapping/>
   </p:clrMapOvr>
+  <mc:AlternateContent xmlns:mc="http://schemas.openxmlformats.org/markup-compatibility/2006" xmlns:p14="http://schemas.microsoft.com/office/powerpoint/2010/main">
+    <mc:Choice Requires="p14">
+      <p:transition p14:dur="60">
+        <p:fade/>
+      </p:transition>
+    </mc:Choice>
+    <mc:Fallback xmlns="">
+      <p:transition>
+        <p:fade/>
+      </p:transition>
+    </mc:Fallback>
+  </mc:AlternateContent>
+  <p:timing>
+    <p:tnLst>
+      <p:par>
+        <p:cTn id="1" dur="indefinite" restart="never" nodeType="tmRoot"/>
+      </p:par>
+    </p:tnLst>
+  </p:timing>
 </p:sldLayout>
 </file>
 
@@ -548,7 +1010,7 @@
         </p:nvSpPr>
         <p:spPr>
           <a:xfrm>
-            <a:off x="6629400" y="274638"/>
+            <a:off x="6629400" y="274639"/>
             <a:ext cx="2057400" cy="5851525"/>
           </a:xfrm>
         </p:spPr>
@@ -576,7 +1038,7 @@
         </p:nvSpPr>
         <p:spPr>
           <a:xfrm>
-            <a:off x="457200" y="274638"/>
+            <a:off x="457200" y="274639"/>
             <a:ext cx="6019800" cy="5851525"/>
           </a:xfrm>
         </p:spPr>
@@ -636,9 +1098,9 @@
           <a:bodyPr/>
           <a:lstStyle/>
           <a:p>
-            <a:fld id="{532E3D2B-DE49-4F26-AD30-F1E36EDC6A10}" type="datetimeFigureOut">
-              <a:rPr lang="en-US" smtClean="0"/>
-              <a:t>9/9/2012</a:t>
+            <a:fld id="{2F5BB042-2B17-413A-8BB2-6FDBD0381532}" type="datetimeFigureOut">
+              <a:rPr lang="en-US" smtClean="0"/>
+              <a:t>11/18/2012</a:t>
             </a:fld>
             <a:endParaRPr lang="en-US"/>
           </a:p>
@@ -678,7 +1140,7 @@
           <a:bodyPr/>
           <a:lstStyle/>
           <a:p>
-            <a:fld id="{35144028-314A-4539-B140-0625171852C6}" type="slidenum">
+            <a:fld id="{F130C7C2-E2F1-465B-8C07-FB00D7F0D149}" type="slidenum">
               <a:rPr lang="en-US" smtClean="0"/>
               <a:t>‹#›</a:t>
             </a:fld>
@@ -689,13 +1151,32 @@
     </p:spTree>
     <p:extLst>
       <p:ext uri="{BB962C8B-B14F-4D97-AF65-F5344CB8AC3E}">
-        <p14:creationId xmlns:p14="http://schemas.microsoft.com/office/powerpoint/2010/main" val="1560644038"/>
+        <p14:creationId xmlns:p14="http://schemas.microsoft.com/office/powerpoint/2010/main" val="2969516489"/>
       </p:ext>
     </p:extLst>
   </p:cSld>
   <p:clrMapOvr>
     <a:masterClrMapping/>
   </p:clrMapOvr>
+  <mc:AlternateContent xmlns:mc="http://schemas.openxmlformats.org/markup-compatibility/2006" xmlns:p14="http://schemas.microsoft.com/office/powerpoint/2010/main">
+    <mc:Choice Requires="p14">
+      <p:transition p14:dur="60">
+        <p:fade/>
+      </p:transition>
+    </mc:Choice>
+    <mc:Fallback xmlns="">
+      <p:transition>
+        <p:fade/>
+      </p:transition>
+    </mc:Fallback>
+  </mc:AlternateContent>
+  <p:timing>
+    <p:tnLst>
+      <p:par>
+        <p:cTn id="1" dur="indefinite" restart="never" nodeType="tmRoot"/>
+      </p:par>
+    </p:tnLst>
+  </p:timing>
 </p:sldLayout>
 </file>
 
@@ -726,27 +1207,178 @@
             <p:ph type="title"/>
           </p:nvPr>
         </p:nvSpPr>
+        <p:spPr>
+          <a:xfrm>
+            <a:off x="-76200" y="274639"/>
+            <a:ext cx="9296400" cy="1143000"/>
+          </a:xfrm>
+          <a:blipFill dpi="0" rotWithShape="1">
+            <a:blip r:embed="rId2"/>
+            <a:srcRect/>
+            <a:tile tx="0" ty="0" sx="100000" sy="100000" flip="none" algn="tl"/>
+          </a:blipFill>
+          <a:effectLst>
+            <a:glow rad="101600">
+              <a:srgbClr val="8A9AA1">
+                <a:alpha val="52000"/>
+              </a:srgbClr>
+            </a:glow>
+            <a:innerShdw blurRad="406400">
+              <a:prstClr val="black"/>
+            </a:innerShdw>
+          </a:effectLst>
+        </p:spPr>
+        <p:txBody>
+          <a:bodyPr vert="horz" lIns="91440" tIns="45720" rIns="91440" bIns="45720" rtlCol="0" anchor="ctr">
+            <a:noAutofit/>
+          </a:bodyPr>
+          <a:lstStyle>
+            <a:lvl1pPr>
+              <a:defRPr lang="en-US" sz="3200" b="0" strike="noStrike" cap="all" spc="300" normalizeH="0" baseline="0">
+                <a:solidFill>
+                  <a:schemeClr val="bg1"/>
+                </a:solidFill>
+                <a:effectLst>
+                  <a:outerShdw blurRad="38100" dist="38100" dir="2700000" algn="tl">
+                    <a:srgbClr val="000000">
+                      <a:alpha val="43137"/>
+                    </a:srgbClr>
+                  </a:outerShdw>
+                </a:effectLst>
+                <a:latin typeface="Roboto Lt" pitchFamily="2" charset="0"/>
+                <a:ea typeface="Roboto Lt" pitchFamily="2" charset="0"/>
+              </a:defRPr>
+            </a:lvl1pPr>
+          </a:lstStyle>
+          <a:p>
+            <a:pPr lvl="0"/>
+            <a:r>
+              <a:rPr lang="en-US" smtClean="0"/>
+              <a:t>Click to edit Master title style</a:t>
+            </a:r>
+            <a:endParaRPr lang="en-US" dirty="0"/>
+          </a:p>
+        </p:txBody>
+      </p:sp>
+      <p:sp>
+        <p:nvSpPr>
+          <p:cNvPr id="3" name="Content Placeholder 2"/>
+          <p:cNvSpPr>
+            <a:spLocks noGrp="1"/>
+          </p:cNvSpPr>
+          <p:nvPr>
+            <p:ph idx="1"/>
+          </p:nvPr>
+        </p:nvSpPr>
+        <p:spPr/>
+        <p:txBody>
+          <a:bodyPr/>
+          <a:lstStyle>
+            <a:lvl1pPr>
+              <a:defRPr>
+                <a:latin typeface="Roboto Lt" pitchFamily="2" charset="0"/>
+                <a:ea typeface="Roboto Lt" pitchFamily="2" charset="0"/>
+                <a:cs typeface="Droid Sans" pitchFamily="34" charset="0"/>
+              </a:defRPr>
+            </a:lvl1pPr>
+            <a:lvl2pPr>
+              <a:defRPr>
+                <a:latin typeface="Roboto Lt" pitchFamily="2" charset="0"/>
+                <a:ea typeface="Roboto Lt" pitchFamily="2" charset="0"/>
+                <a:cs typeface="Droid Sans" pitchFamily="34" charset="0"/>
+              </a:defRPr>
+            </a:lvl2pPr>
+            <a:lvl3pPr>
+              <a:defRPr>
+                <a:latin typeface="Roboto Lt" pitchFamily="2" charset="0"/>
+                <a:ea typeface="Roboto Lt" pitchFamily="2" charset="0"/>
+                <a:cs typeface="Droid Sans" pitchFamily="34" charset="0"/>
+              </a:defRPr>
+            </a:lvl3pPr>
+            <a:lvl4pPr>
+              <a:defRPr>
+                <a:latin typeface="Roboto Lt" pitchFamily="2" charset="0"/>
+                <a:ea typeface="Roboto Lt" pitchFamily="2" charset="0"/>
+                <a:cs typeface="Droid Sans" pitchFamily="34" charset="0"/>
+              </a:defRPr>
+            </a:lvl4pPr>
+            <a:lvl5pPr>
+              <a:defRPr>
+                <a:latin typeface="Roboto Lt" pitchFamily="2" charset="0"/>
+                <a:ea typeface="Roboto Lt" pitchFamily="2" charset="0"/>
+                <a:cs typeface="Droid Sans" pitchFamily="34" charset="0"/>
+              </a:defRPr>
+            </a:lvl5pPr>
+          </a:lstStyle>
+          <a:p>
+            <a:pPr lvl="0"/>
+            <a:r>
+              <a:rPr lang="en-US" smtClean="0"/>
+              <a:t>Click to edit Master text styles</a:t>
+            </a:r>
+          </a:p>
+          <a:p>
+            <a:pPr lvl="1"/>
+            <a:r>
+              <a:rPr lang="en-US" smtClean="0"/>
+              <a:t>Second level</a:t>
+            </a:r>
+          </a:p>
+          <a:p>
+            <a:pPr lvl="2"/>
+            <a:r>
+              <a:rPr lang="en-US" smtClean="0"/>
+              <a:t>Third level</a:t>
+            </a:r>
+          </a:p>
+          <a:p>
+            <a:pPr lvl="3"/>
+            <a:r>
+              <a:rPr lang="en-US" smtClean="0"/>
+              <a:t>Fourth level</a:t>
+            </a:r>
+          </a:p>
+          <a:p>
+            <a:pPr lvl="4"/>
+            <a:r>
+              <a:rPr lang="en-US" smtClean="0"/>
+              <a:t>Fifth level</a:t>
+            </a:r>
+            <a:endParaRPr lang="en-US"/>
+          </a:p>
+        </p:txBody>
+      </p:sp>
+      <p:sp>
+        <p:nvSpPr>
+          <p:cNvPr id="4" name="Date Placeholder 3"/>
+          <p:cNvSpPr>
+            <a:spLocks noGrp="1"/>
+          </p:cNvSpPr>
+          <p:nvPr>
+            <p:ph type="dt" sz="half" idx="10"/>
+          </p:nvPr>
+        </p:nvSpPr>
         <p:spPr/>
         <p:txBody>
           <a:bodyPr/>
           <a:lstStyle/>
           <a:p>
-            <a:r>
-              <a:rPr lang="en-US" smtClean="0"/>
-              <a:t>Click to edit Master title style</a:t>
-            </a:r>
+            <a:fld id="{2F5BB042-2B17-413A-8BB2-6FDBD0381532}" type="datetimeFigureOut">
+              <a:rPr lang="en-US" smtClean="0"/>
+              <a:t>11/18/2012</a:t>
+            </a:fld>
             <a:endParaRPr lang="en-US"/>
           </a:p>
         </p:txBody>
       </p:sp>
       <p:sp>
         <p:nvSpPr>
-          <p:cNvPr id="3" name="Content Placeholder 2"/>
-          <p:cNvSpPr>
-            <a:spLocks noGrp="1"/>
-          </p:cNvSpPr>
-          <p:nvPr>
-            <p:ph idx="1"/>
+          <p:cNvPr id="5" name="Footer Placeholder 4"/>
+          <p:cNvSpPr>
+            <a:spLocks noGrp="1"/>
+          </p:cNvSpPr>
+          <p:nvPr>
+            <p:ph type="ftr" sz="quarter" idx="11"/>
           </p:nvPr>
         </p:nvSpPr>
         <p:spPr/>
@@ -754,51 +1386,18 @@
           <a:bodyPr/>
           <a:lstStyle/>
           <a:p>
-            <a:pPr lvl="0"/>
-            <a:r>
-              <a:rPr lang="en-US" smtClean="0"/>
-              <a:t>Click to edit Master text styles</a:t>
-            </a:r>
-          </a:p>
-          <a:p>
-            <a:pPr lvl="1"/>
-            <a:r>
-              <a:rPr lang="en-US" smtClean="0"/>
-              <a:t>Second level</a:t>
-            </a:r>
-          </a:p>
-          <a:p>
-            <a:pPr lvl="2"/>
-            <a:r>
-              <a:rPr lang="en-US" smtClean="0"/>
-              <a:t>Third level</a:t>
-            </a:r>
-          </a:p>
-          <a:p>
-            <a:pPr lvl="3"/>
-            <a:r>
-              <a:rPr lang="en-US" smtClean="0"/>
-              <a:t>Fourth level</a:t>
-            </a:r>
-          </a:p>
-          <a:p>
-            <a:pPr lvl="4"/>
-            <a:r>
-              <a:rPr lang="en-US" smtClean="0"/>
-              <a:t>Fifth level</a:t>
-            </a:r>
             <a:endParaRPr lang="en-US"/>
           </a:p>
         </p:txBody>
       </p:sp>
       <p:sp>
         <p:nvSpPr>
-          <p:cNvPr id="4" name="Date Placeholder 3"/>
-          <p:cNvSpPr>
-            <a:spLocks noGrp="1"/>
-          </p:cNvSpPr>
-          <p:nvPr>
-            <p:ph type="dt" sz="half" idx="10"/>
+          <p:cNvPr id="6" name="Slide Number Placeholder 5"/>
+          <p:cNvSpPr>
+            <a:spLocks noGrp="1"/>
+          </p:cNvSpPr>
+          <p:nvPr>
+            <p:ph type="sldNum" sz="quarter" idx="12"/>
           </p:nvPr>
         </p:nvSpPr>
         <p:spPr/>
@@ -806,49 +1405,7 @@
           <a:bodyPr/>
           <a:lstStyle/>
           <a:p>
-            <a:fld id="{532E3D2B-DE49-4F26-AD30-F1E36EDC6A10}" type="datetimeFigureOut">
-              <a:rPr lang="en-US" smtClean="0"/>
-              <a:t>9/9/2012</a:t>
-            </a:fld>
-            <a:endParaRPr lang="en-US"/>
-          </a:p>
-        </p:txBody>
-      </p:sp>
-      <p:sp>
-        <p:nvSpPr>
-          <p:cNvPr id="5" name="Footer Placeholder 4"/>
-          <p:cNvSpPr>
-            <a:spLocks noGrp="1"/>
-          </p:cNvSpPr>
-          <p:nvPr>
-            <p:ph type="ftr" sz="quarter" idx="11"/>
-          </p:nvPr>
-        </p:nvSpPr>
-        <p:spPr/>
-        <p:txBody>
-          <a:bodyPr/>
-          <a:lstStyle/>
-          <a:p>
-            <a:endParaRPr lang="en-US"/>
-          </a:p>
-        </p:txBody>
-      </p:sp>
-      <p:sp>
-        <p:nvSpPr>
-          <p:cNvPr id="6" name="Slide Number Placeholder 5"/>
-          <p:cNvSpPr>
-            <a:spLocks noGrp="1"/>
-          </p:cNvSpPr>
-          <p:nvPr>
-            <p:ph type="sldNum" sz="quarter" idx="12"/>
-          </p:nvPr>
-        </p:nvSpPr>
-        <p:spPr/>
-        <p:txBody>
-          <a:bodyPr/>
-          <a:lstStyle/>
-          <a:p>
-            <a:fld id="{35144028-314A-4539-B140-0625171852C6}" type="slidenum">
+            <a:fld id="{F130C7C2-E2F1-465B-8C07-FB00D7F0D149}" type="slidenum">
               <a:rPr lang="en-US" smtClean="0"/>
               <a:t>‹#›</a:t>
             </a:fld>
@@ -859,13 +1416,32 @@
     </p:spTree>
     <p:extLst>
       <p:ext uri="{BB962C8B-B14F-4D97-AF65-F5344CB8AC3E}">
-        <p14:creationId xmlns:p14="http://schemas.microsoft.com/office/powerpoint/2010/main" val="4202968804"/>
+        <p14:creationId xmlns:p14="http://schemas.microsoft.com/office/powerpoint/2010/main" val="2308842273"/>
       </p:ext>
     </p:extLst>
   </p:cSld>
   <p:clrMapOvr>
     <a:masterClrMapping/>
   </p:clrMapOvr>
+  <mc:AlternateContent xmlns:mc="http://schemas.openxmlformats.org/markup-compatibility/2006" xmlns:p14="http://schemas.microsoft.com/office/powerpoint/2010/main">
+    <mc:Choice Requires="p14">
+      <p:transition p14:dur="60">
+        <p:fade/>
+      </p:transition>
+    </mc:Choice>
+    <mc:Fallback xmlns="">
+      <p:transition>
+        <p:fade/>
+      </p:transition>
+    </mc:Fallback>
+  </mc:AlternateContent>
+  <p:timing>
+    <p:tnLst>
+      <p:par>
+        <p:cTn id="1" dur="indefinite" restart="never" nodeType="tmRoot"/>
+      </p:par>
+    </p:tnLst>
+  </p:timing>
 </p:sldLayout>
 </file>
 
@@ -898,15 +1474,17 @@
         </p:nvSpPr>
         <p:spPr>
           <a:xfrm>
-            <a:off x="722313" y="4406900"/>
+            <a:off x="722313" y="4406901"/>
             <a:ext cx="7772400" cy="1362075"/>
           </a:xfrm>
         </p:spPr>
         <p:txBody>
-          <a:bodyPr anchor="t"/>
+          <a:bodyPr anchor="t">
+            <a:normAutofit/>
+          </a:bodyPr>
           <a:lstStyle>
             <a:lvl1pPr algn="l">
-              <a:defRPr sz="4000" b="1" cap="all"/>
+              <a:defRPr sz="3200" b="0" cap="all"/>
             </a:lvl1pPr>
           </a:lstStyle>
           <a:p>
@@ -1052,9 +1630,9 @@
           <a:bodyPr/>
           <a:lstStyle/>
           <a:p>
-            <a:fld id="{532E3D2B-DE49-4F26-AD30-F1E36EDC6A10}" type="datetimeFigureOut">
-              <a:rPr lang="en-US" smtClean="0"/>
-              <a:t>9/9/2012</a:t>
+            <a:fld id="{2F5BB042-2B17-413A-8BB2-6FDBD0381532}" type="datetimeFigureOut">
+              <a:rPr lang="en-US" smtClean="0"/>
+              <a:t>11/18/2012</a:t>
             </a:fld>
             <a:endParaRPr lang="en-US"/>
           </a:p>
@@ -1094,7 +1672,7 @@
           <a:bodyPr/>
           <a:lstStyle/>
           <a:p>
-            <a:fld id="{35144028-314A-4539-B140-0625171852C6}" type="slidenum">
+            <a:fld id="{F130C7C2-E2F1-465B-8C07-FB00D7F0D149}" type="slidenum">
               <a:rPr lang="en-US" smtClean="0"/>
               <a:t>‹#›</a:t>
             </a:fld>
@@ -1105,13 +1683,32 @@
     </p:spTree>
     <p:extLst>
       <p:ext uri="{BB962C8B-B14F-4D97-AF65-F5344CB8AC3E}">
-        <p14:creationId xmlns:p14="http://schemas.microsoft.com/office/powerpoint/2010/main" val="1332189033"/>
+        <p14:creationId xmlns:p14="http://schemas.microsoft.com/office/powerpoint/2010/main" val="434113752"/>
       </p:ext>
     </p:extLst>
   </p:cSld>
   <p:clrMapOvr>
     <a:masterClrMapping/>
   </p:clrMapOvr>
+  <mc:AlternateContent xmlns:mc="http://schemas.openxmlformats.org/markup-compatibility/2006" xmlns:p14="http://schemas.microsoft.com/office/powerpoint/2010/main">
+    <mc:Choice Requires="p14">
+      <p:transition p14:dur="60">
+        <p:fade/>
+      </p:transition>
+    </mc:Choice>
+    <mc:Fallback xmlns="">
+      <p:transition>
+        <p:fade/>
+      </p:transition>
+    </mc:Fallback>
+  </mc:AlternateContent>
+  <p:timing>
+    <p:tnLst>
+      <p:par>
+        <p:cTn id="1" dur="indefinite" restart="never" nodeType="tmRoot"/>
+      </p:par>
+    </p:tnLst>
+  </p:timing>
 </p:sldLayout>
 </file>
 
@@ -1167,7 +1764,7 @@
         </p:nvSpPr>
         <p:spPr>
           <a:xfrm>
-            <a:off x="457200" y="1600200"/>
+            <a:off x="457200" y="1600201"/>
             <a:ext cx="4038600" cy="4525963"/>
           </a:xfrm>
         </p:spPr>
@@ -1252,7 +1849,7 @@
         </p:nvSpPr>
         <p:spPr>
           <a:xfrm>
-            <a:off x="4648200" y="1600200"/>
+            <a:off x="4648200" y="1600201"/>
             <a:ext cx="4038600" cy="4525963"/>
           </a:xfrm>
         </p:spPr>
@@ -1340,9 +1937,9 @@
           <a:bodyPr/>
           <a:lstStyle/>
           <a:p>
-            <a:fld id="{532E3D2B-DE49-4F26-AD30-F1E36EDC6A10}" type="datetimeFigureOut">
-              <a:rPr lang="en-US" smtClean="0"/>
-              <a:t>9/9/2012</a:t>
+            <a:fld id="{2F5BB042-2B17-413A-8BB2-6FDBD0381532}" type="datetimeFigureOut">
+              <a:rPr lang="en-US" smtClean="0"/>
+              <a:t>11/18/2012</a:t>
             </a:fld>
             <a:endParaRPr lang="en-US"/>
           </a:p>
@@ -1382,7 +1979,7 @@
           <a:bodyPr/>
           <a:lstStyle/>
           <a:p>
-            <a:fld id="{35144028-314A-4539-B140-0625171852C6}" type="slidenum">
+            <a:fld id="{F130C7C2-E2F1-465B-8C07-FB00D7F0D149}" type="slidenum">
               <a:rPr lang="en-US" smtClean="0"/>
               <a:t>‹#›</a:t>
             </a:fld>
@@ -1393,13 +1990,32 @@
     </p:spTree>
     <p:extLst>
       <p:ext uri="{BB962C8B-B14F-4D97-AF65-F5344CB8AC3E}">
-        <p14:creationId xmlns:p14="http://schemas.microsoft.com/office/powerpoint/2010/main" val="2823354863"/>
+        <p14:creationId xmlns:p14="http://schemas.microsoft.com/office/powerpoint/2010/main" val="1680843911"/>
       </p:ext>
     </p:extLst>
   </p:cSld>
   <p:clrMapOvr>
     <a:masterClrMapping/>
   </p:clrMapOvr>
+  <mc:AlternateContent xmlns:mc="http://schemas.openxmlformats.org/markup-compatibility/2006" xmlns:p14="http://schemas.microsoft.com/office/powerpoint/2010/main">
+    <mc:Choice Requires="p14">
+      <p:transition p14:dur="60">
+        <p:fade/>
+      </p:transition>
+    </mc:Choice>
+    <mc:Fallback xmlns="">
+      <p:transition>
+        <p:fade/>
+      </p:transition>
+    </mc:Fallback>
+  </mc:AlternateContent>
+  <p:timing>
+    <p:tnLst>
+      <p:par>
+        <p:cTn id="1" dur="indefinite" restart="never" nodeType="tmRoot"/>
+      </p:par>
+    </p:tnLst>
+  </p:timing>
 </p:sldLayout>
 </file>
 
@@ -1460,7 +2076,7 @@
         <p:spPr>
           <a:xfrm>
             <a:off x="457200" y="1535113"/>
-            <a:ext cx="4040188" cy="639762"/>
+            <a:ext cx="4040188" cy="639763"/>
           </a:xfrm>
         </p:spPr>
         <p:txBody>
@@ -1609,8 +2225,8 @@
         </p:nvSpPr>
         <p:spPr>
           <a:xfrm>
-            <a:off x="4645025" y="1535113"/>
-            <a:ext cx="4041775" cy="639762"/>
+            <a:off x="4645027" y="1535113"/>
+            <a:ext cx="4041775" cy="639763"/>
           </a:xfrm>
         </p:spPr>
         <p:txBody>
@@ -1674,7 +2290,7 @@
         </p:nvSpPr>
         <p:spPr>
           <a:xfrm>
-            <a:off x="4645025" y="2174875"/>
+            <a:off x="4645027" y="2174875"/>
             <a:ext cx="4041775" cy="3951288"/>
           </a:xfrm>
         </p:spPr>
@@ -1762,9 +2378,9 @@
           <a:bodyPr/>
           <a:lstStyle/>
           <a:p>
-            <a:fld id="{532E3D2B-DE49-4F26-AD30-F1E36EDC6A10}" type="datetimeFigureOut">
-              <a:rPr lang="en-US" smtClean="0"/>
-              <a:t>9/9/2012</a:t>
+            <a:fld id="{2F5BB042-2B17-413A-8BB2-6FDBD0381532}" type="datetimeFigureOut">
+              <a:rPr lang="en-US" smtClean="0"/>
+              <a:t>11/18/2012</a:t>
             </a:fld>
             <a:endParaRPr lang="en-US"/>
           </a:p>
@@ -1804,7 +2420,7 @@
           <a:bodyPr/>
           <a:lstStyle/>
           <a:p>
-            <a:fld id="{35144028-314A-4539-B140-0625171852C6}" type="slidenum">
+            <a:fld id="{F130C7C2-E2F1-465B-8C07-FB00D7F0D149}" type="slidenum">
               <a:rPr lang="en-US" smtClean="0"/>
               <a:t>‹#›</a:t>
             </a:fld>
@@ -1815,13 +2431,25 @@
     </p:spTree>
     <p:extLst>
       <p:ext uri="{BB962C8B-B14F-4D97-AF65-F5344CB8AC3E}">
-        <p14:creationId xmlns:p14="http://schemas.microsoft.com/office/powerpoint/2010/main" val="500279961"/>
+        <p14:creationId xmlns:p14="http://schemas.microsoft.com/office/powerpoint/2010/main" val="248300969"/>
       </p:ext>
     </p:extLst>
   </p:cSld>
   <p:clrMapOvr>
     <a:masterClrMapping/>
   </p:clrMapOvr>
+  <mc:AlternateContent xmlns:mc="http://schemas.openxmlformats.org/markup-compatibility/2006" xmlns:p14="http://schemas.microsoft.com/office/powerpoint/2010/main">
+    <mc:Choice Requires="p14">
+      <p:transition p14:dur="60">
+        <p:fade/>
+      </p:transition>
+    </mc:Choice>
+    <mc:Fallback xmlns="">
+      <p:transition>
+        <p:fade/>
+      </p:transition>
+    </mc:Fallback>
+  </mc:AlternateContent>
 </p:sldLayout>
 </file>
 
@@ -1852,94 +2480,88 @@
             <p:ph type="title"/>
           </p:nvPr>
         </p:nvSpPr>
-        <p:spPr/>
-        <p:txBody>
-          <a:bodyPr/>
-          <a:lstStyle/>
+        <p:spPr>
+          <a:xfrm>
+            <a:off x="-76200" y="274637"/>
+            <a:ext cx="9296400" cy="6278563"/>
+          </a:xfrm>
+          <a:blipFill dpi="0" rotWithShape="1">
+            <a:blip r:embed="rId2"/>
+            <a:srcRect/>
+            <a:tile tx="0" ty="0" sx="100000" sy="100000" flip="none" algn="tl"/>
+          </a:blipFill>
+          <a:effectLst>
+            <a:glow rad="101600">
+              <a:srgbClr val="8A9AA1">
+                <a:alpha val="52000"/>
+              </a:srgbClr>
+            </a:glow>
+            <a:innerShdw blurRad="1219200">
+              <a:prstClr val="black"/>
+            </a:innerShdw>
+          </a:effectLst>
+        </p:spPr>
+        <p:txBody>
+          <a:bodyPr>
+            <a:normAutofit/>
+          </a:bodyPr>
+          <a:lstStyle>
+            <a:lvl1pPr>
+              <a:defRPr lang="en-US" sz="8000" b="0" strike="noStrike" kern="1200" cap="all" spc="-300" normalizeH="0" baseline="0" dirty="0">
+                <a:solidFill>
+                  <a:schemeClr val="bg1"/>
+                </a:solidFill>
+                <a:effectLst>
+                  <a:outerShdw blurRad="38100" dist="38100" dir="2700000" algn="tl">
+                    <a:srgbClr val="000000">
+                      <a:alpha val="43137"/>
+                    </a:srgbClr>
+                  </a:outerShdw>
+                </a:effectLst>
+                <a:latin typeface="Roboto Bk" pitchFamily="2" charset="0"/>
+                <a:ea typeface="Roboto Bk" pitchFamily="2" charset="0"/>
+                <a:cs typeface="+mj-cs"/>
+              </a:defRPr>
+            </a:lvl1pPr>
+          </a:lstStyle>
           <a:p>
             <a:r>
               <a:rPr lang="en-US" smtClean="0"/>
               <a:t>Click to edit Master title style</a:t>
             </a:r>
-            <a:endParaRPr lang="en-US"/>
-          </a:p>
-        </p:txBody>
-      </p:sp>
-      <p:sp>
-        <p:nvSpPr>
-          <p:cNvPr id="3" name="Date Placeholder 2"/>
-          <p:cNvSpPr>
-            <a:spLocks noGrp="1"/>
-          </p:cNvSpPr>
-          <p:nvPr>
-            <p:ph type="dt" sz="half" idx="10"/>
-          </p:nvPr>
-        </p:nvSpPr>
-        <p:spPr/>
-        <p:txBody>
-          <a:bodyPr/>
-          <a:lstStyle/>
-          <a:p>
-            <a:fld id="{532E3D2B-DE49-4F26-AD30-F1E36EDC6A10}" type="datetimeFigureOut">
-              <a:rPr lang="en-US" smtClean="0"/>
-              <a:t>9/9/2012</a:t>
-            </a:fld>
-            <a:endParaRPr lang="en-US"/>
-          </a:p>
-        </p:txBody>
-      </p:sp>
-      <p:sp>
-        <p:nvSpPr>
-          <p:cNvPr id="4" name="Footer Placeholder 3"/>
-          <p:cNvSpPr>
-            <a:spLocks noGrp="1"/>
-          </p:cNvSpPr>
-          <p:nvPr>
-            <p:ph type="ftr" sz="quarter" idx="11"/>
-          </p:nvPr>
-        </p:nvSpPr>
-        <p:spPr/>
-        <p:txBody>
-          <a:bodyPr/>
-          <a:lstStyle/>
-          <a:p>
-            <a:endParaRPr lang="en-US"/>
-          </a:p>
-        </p:txBody>
-      </p:sp>
-      <p:sp>
-        <p:nvSpPr>
-          <p:cNvPr id="5" name="Slide Number Placeholder 4"/>
-          <p:cNvSpPr>
-            <a:spLocks noGrp="1"/>
-          </p:cNvSpPr>
-          <p:nvPr>
-            <p:ph type="sldNum" sz="quarter" idx="12"/>
-          </p:nvPr>
-        </p:nvSpPr>
-        <p:spPr/>
-        <p:txBody>
-          <a:bodyPr/>
-          <a:lstStyle/>
-          <a:p>
-            <a:fld id="{35144028-314A-4539-B140-0625171852C6}" type="slidenum">
-              <a:rPr lang="en-US" smtClean="0"/>
-              <a:t>‹#›</a:t>
-            </a:fld>
-            <a:endParaRPr lang="en-US"/>
+            <a:endParaRPr lang="en-US" dirty="0"/>
           </a:p>
         </p:txBody>
       </p:sp>
     </p:spTree>
     <p:extLst>
       <p:ext uri="{BB962C8B-B14F-4D97-AF65-F5344CB8AC3E}">
-        <p14:creationId xmlns:p14="http://schemas.microsoft.com/office/powerpoint/2010/main" val="2155559751"/>
+        <p14:creationId xmlns:p14="http://schemas.microsoft.com/office/powerpoint/2010/main" val="54480764"/>
       </p:ext>
     </p:extLst>
   </p:cSld>
   <p:clrMapOvr>
     <a:masterClrMapping/>
   </p:clrMapOvr>
+  <mc:AlternateContent xmlns:mc="http://schemas.openxmlformats.org/markup-compatibility/2006" xmlns:p14="http://schemas.microsoft.com/office/powerpoint/2010/main">
+    <mc:Choice Requires="p14">
+      <p:transition p14:dur="60">
+        <p:fade/>
+      </p:transition>
+    </mc:Choice>
+    <mc:Fallback xmlns="">
+      <p:transition>
+        <p:fade/>
+      </p:transition>
+    </mc:Fallback>
+  </mc:AlternateContent>
+  <p:timing>
+    <p:tnLst>
+      <p:par>
+        <p:cTn id="1" dur="indefinite" restart="never" nodeType="tmRoot"/>
+      </p:par>
+    </p:tnLst>
+  </p:timing>
 </p:sldLayout>
 </file>
 
@@ -1975,9 +2597,9 @@
           <a:bodyPr/>
           <a:lstStyle/>
           <a:p>
-            <a:fld id="{532E3D2B-DE49-4F26-AD30-F1E36EDC6A10}" type="datetimeFigureOut">
-              <a:rPr lang="en-US" smtClean="0"/>
-              <a:t>9/9/2012</a:t>
+            <a:fld id="{2F5BB042-2B17-413A-8BB2-6FDBD0381532}" type="datetimeFigureOut">
+              <a:rPr lang="en-US" smtClean="0"/>
+              <a:t>11/18/2012</a:t>
             </a:fld>
             <a:endParaRPr lang="en-US"/>
           </a:p>
@@ -2017,7 +2639,7 @@
           <a:bodyPr/>
           <a:lstStyle/>
           <a:p>
-            <a:fld id="{35144028-314A-4539-B140-0625171852C6}" type="slidenum">
+            <a:fld id="{F130C7C2-E2F1-465B-8C07-FB00D7F0D149}" type="slidenum">
               <a:rPr lang="en-US" smtClean="0"/>
               <a:t>‹#›</a:t>
             </a:fld>
@@ -2028,13 +2650,25 @@
     </p:spTree>
     <p:extLst>
       <p:ext uri="{BB962C8B-B14F-4D97-AF65-F5344CB8AC3E}">
-        <p14:creationId xmlns:p14="http://schemas.microsoft.com/office/powerpoint/2010/main" val="1840378099"/>
+        <p14:creationId xmlns:p14="http://schemas.microsoft.com/office/powerpoint/2010/main" val="3334397594"/>
       </p:ext>
     </p:extLst>
   </p:cSld>
   <p:clrMapOvr>
     <a:masterClrMapping/>
   </p:clrMapOvr>
+  <mc:AlternateContent xmlns:mc="http://schemas.openxmlformats.org/markup-compatibility/2006" xmlns:p14="http://schemas.microsoft.com/office/powerpoint/2010/main">
+    <mc:Choice Requires="p14">
+      <p:transition p14:dur="60">
+        <p:fade/>
+      </p:transition>
+    </mc:Choice>
+    <mc:Fallback xmlns="">
+      <p:transition>
+        <p:fade/>
+      </p:transition>
+    </mc:Fallback>
+  </mc:AlternateContent>
 </p:sldLayout>
 </file>
 
@@ -2067,15 +2701,15 @@
         </p:nvSpPr>
         <p:spPr>
           <a:xfrm>
-            <a:off x="457200" y="273050"/>
-            <a:ext cx="3008313" cy="1162050"/>
+            <a:off x="457202" y="273049"/>
+            <a:ext cx="3008313" cy="1162051"/>
           </a:xfrm>
         </p:spPr>
         <p:txBody>
           <a:bodyPr anchor="b"/>
           <a:lstStyle>
             <a:lvl1pPr algn="l">
-              <a:defRPr sz="2000" b="1"/>
+              <a:defRPr sz="2000" b="0"/>
             </a:lvl1pPr>
           </a:lstStyle>
           <a:p>
@@ -2099,7 +2733,7 @@
         </p:nvSpPr>
         <p:spPr>
           <a:xfrm>
-            <a:off x="3575050" y="273050"/>
+            <a:off x="3575050" y="273052"/>
             <a:ext cx="5111750" cy="5853113"/>
           </a:xfrm>
         </p:spPr>
@@ -2184,7 +2818,7 @@
         </p:nvSpPr>
         <p:spPr>
           <a:xfrm>
-            <a:off x="457200" y="1435100"/>
+            <a:off x="457202" y="1435102"/>
             <a:ext cx="3008313" cy="4691063"/>
           </a:xfrm>
         </p:spPr>
@@ -2252,9 +2886,9 @@
           <a:bodyPr/>
           <a:lstStyle/>
           <a:p>
-            <a:fld id="{532E3D2B-DE49-4F26-AD30-F1E36EDC6A10}" type="datetimeFigureOut">
-              <a:rPr lang="en-US" smtClean="0"/>
-              <a:t>9/9/2012</a:t>
+            <a:fld id="{2F5BB042-2B17-413A-8BB2-6FDBD0381532}" type="datetimeFigureOut">
+              <a:rPr lang="en-US" smtClean="0"/>
+              <a:t>11/18/2012</a:t>
             </a:fld>
             <a:endParaRPr lang="en-US"/>
           </a:p>
@@ -2294,7 +2928,7 @@
           <a:bodyPr/>
           <a:lstStyle/>
           <a:p>
-            <a:fld id="{35144028-314A-4539-B140-0625171852C6}" type="slidenum">
+            <a:fld id="{F130C7C2-E2F1-465B-8C07-FB00D7F0D149}" type="slidenum">
               <a:rPr lang="en-US" smtClean="0"/>
               <a:t>‹#›</a:t>
             </a:fld>
@@ -2305,18 +2939,30 @@
     </p:spTree>
     <p:extLst>
       <p:ext uri="{BB962C8B-B14F-4D97-AF65-F5344CB8AC3E}">
-        <p14:creationId xmlns:p14="http://schemas.microsoft.com/office/powerpoint/2010/main" val="3761650520"/>
+        <p14:creationId xmlns:p14="http://schemas.microsoft.com/office/powerpoint/2010/main" val="3800883126"/>
       </p:ext>
     </p:extLst>
   </p:cSld>
   <p:clrMapOvr>
     <a:masterClrMapping/>
   </p:clrMapOvr>
+  <mc:AlternateContent xmlns:mc="http://schemas.openxmlformats.org/markup-compatibility/2006" xmlns:p14="http://schemas.microsoft.com/office/powerpoint/2010/main">
+    <mc:Choice Requires="p14">
+      <p:transition p14:dur="60">
+        <p:fade/>
+      </p:transition>
+    </mc:Choice>
+    <mc:Fallback xmlns="">
+      <p:transition>
+        <p:fade/>
+      </p:transition>
+    </mc:Fallback>
+  </mc:AlternateContent>
 </p:sldLayout>
 </file>
 
 <file path=ppt/slideLayouts/slideLayout9.xml><?xml version="1.0" encoding="utf-8"?>
-<p:sldLayout xmlns:a="http://schemas.openxmlformats.org/drawingml/2006/main" xmlns:r="http://schemas.openxmlformats.org/officeDocument/2006/relationships" xmlns:p="http://schemas.openxmlformats.org/presentationml/2006/main" type="picTx" preserve="1">
+<p:sldLayout xmlns:a="http://schemas.openxmlformats.org/drawingml/2006/main" xmlns:r="http://schemas.openxmlformats.org/officeDocument/2006/relationships" xmlns:p="http://schemas.openxmlformats.org/presentationml/2006/main" preserve="1">
   <p:cSld name="Picture with Caption">
     <p:spTree>
       <p:nvGrpSpPr>
@@ -2344,23 +2990,54 @@
         </p:nvSpPr>
         <p:spPr>
           <a:xfrm>
-            <a:off x="1792288" y="4800600"/>
-            <a:ext cx="5486400" cy="566738"/>
+            <a:off x="-76200" y="5715000"/>
+            <a:ext cx="9296400" cy="914400"/>
           </a:xfrm>
+          <a:blipFill dpi="0" rotWithShape="1">
+            <a:blip r:embed="rId2"/>
+            <a:srcRect/>
+            <a:tile tx="0" ty="0" sx="100000" sy="100000" flip="none" algn="tl"/>
+          </a:blipFill>
+          <a:effectLst>
+            <a:glow rad="101600">
+              <a:srgbClr val="8A9AA1">
+                <a:alpha val="52000"/>
+              </a:srgbClr>
+            </a:glow>
+            <a:innerShdw blurRad="406400">
+              <a:prstClr val="black"/>
+            </a:innerShdw>
+          </a:effectLst>
         </p:spPr>
         <p:txBody>
-          <a:bodyPr anchor="b"/>
+          <a:bodyPr vert="horz" lIns="91440" tIns="45720" rIns="91440" bIns="45720" rtlCol="0" anchor="ctr">
+            <a:noAutofit/>
+          </a:bodyPr>
           <a:lstStyle>
-            <a:lvl1pPr algn="l">
-              <a:defRPr sz="2000" b="1"/>
+            <a:lvl1pPr>
+              <a:defRPr lang="en-US" b="0" strike="noStrike" cap="all" spc="300" normalizeH="0" baseline="0">
+                <a:solidFill>
+                  <a:schemeClr val="bg1"/>
+                </a:solidFill>
+                <a:effectLst>
+                  <a:outerShdw blurRad="38100" dist="38100" dir="2700000" algn="tl">
+                    <a:srgbClr val="000000">
+                      <a:alpha val="43137"/>
+                    </a:srgbClr>
+                  </a:outerShdw>
+                </a:effectLst>
+                <a:latin typeface="Roboto Lt" pitchFamily="2" charset="0"/>
+                <a:ea typeface="Roboto Lt" pitchFamily="2" charset="0"/>
+              </a:defRPr>
             </a:lvl1pPr>
           </a:lstStyle>
           <a:p>
+            <a:pPr lvl="0"/>
             <a:r>
               <a:rPr lang="en-US" smtClean="0"/>
               <a:t>Click to edit Master title style</a:t>
             </a:r>
-            <a:endParaRPr lang="en-US"/>
+            <a:endParaRPr lang="en-US" dirty="0"/>
           </a:p>
         </p:txBody>
       </p:sp>
@@ -2368,7 +3045,7 @@
         <p:nvSpPr>
           <p:cNvPr id="3" name="Picture Placeholder 2"/>
           <p:cNvSpPr>
-            <a:spLocks noGrp="1"/>
+            <a:spLocks noGrp="1" noChangeAspect="1"/>
           </p:cNvSpPr>
           <p:nvPr>
             <p:ph type="pic" idx="1"/>
@@ -2376,9 +3053,16 @@
         </p:nvSpPr>
         <p:spPr>
           <a:xfrm>
-            <a:off x="1792288" y="612775"/>
-            <a:ext cx="5486400" cy="4114800"/>
+            <a:off x="914400" y="228600"/>
+            <a:ext cx="7315200" cy="5257800"/>
           </a:xfrm>
+          <a:effectLst>
+            <a:glow rad="101600">
+              <a:srgbClr val="8A9AA1">
+                <a:alpha val="36000"/>
+              </a:srgbClr>
+            </a:glow>
+          </a:effectLst>
         </p:spPr>
         <p:txBody>
           <a:bodyPr/>
@@ -2421,150 +3105,43 @@
             </a:lvl9pPr>
           </a:lstStyle>
           <a:p>
-            <a:endParaRPr lang="en-US"/>
-          </a:p>
-        </p:txBody>
-      </p:sp>
-      <p:sp>
-        <p:nvSpPr>
-          <p:cNvPr id="4" name="Text Placeholder 3"/>
-          <p:cNvSpPr>
-            <a:spLocks noGrp="1"/>
-          </p:cNvSpPr>
-          <p:nvPr>
-            <p:ph type="body" sz="half" idx="2"/>
-          </p:nvPr>
-        </p:nvSpPr>
-        <p:spPr>
-          <a:xfrm>
-            <a:off x="1792288" y="5367338"/>
-            <a:ext cx="5486400" cy="804862"/>
-          </a:xfrm>
-        </p:spPr>
-        <p:txBody>
-          <a:bodyPr/>
-          <a:lstStyle>
-            <a:lvl1pPr marL="0" indent="0">
-              <a:buNone/>
-              <a:defRPr sz="1400"/>
-            </a:lvl1pPr>
-            <a:lvl2pPr marL="457200" indent="0">
-              <a:buNone/>
-              <a:defRPr sz="1200"/>
-            </a:lvl2pPr>
-            <a:lvl3pPr marL="914400" indent="0">
-              <a:buNone/>
-              <a:defRPr sz="1000"/>
-            </a:lvl3pPr>
-            <a:lvl4pPr marL="1371600" indent="0">
-              <a:buNone/>
-              <a:defRPr sz="900"/>
-            </a:lvl4pPr>
-            <a:lvl5pPr marL="1828800" indent="0">
-              <a:buNone/>
-              <a:defRPr sz="900"/>
-            </a:lvl5pPr>
-            <a:lvl6pPr marL="2286000" indent="0">
-              <a:buNone/>
-              <a:defRPr sz="900"/>
-            </a:lvl6pPr>
-            <a:lvl7pPr marL="2743200" indent="0">
-              <a:buNone/>
-              <a:defRPr sz="900"/>
-            </a:lvl7pPr>
-            <a:lvl8pPr marL="3200400" indent="0">
-              <a:buNone/>
-              <a:defRPr sz="900"/>
-            </a:lvl8pPr>
-            <a:lvl9pPr marL="3657600" indent="0">
-              <a:buNone/>
-              <a:defRPr sz="900"/>
-            </a:lvl9pPr>
-          </a:lstStyle>
-          <a:p>
-            <a:pPr lvl="0"/>
-            <a:r>
-              <a:rPr lang="en-US" smtClean="0"/>
-              <a:t>Click to edit Master text styles</a:t>
-            </a:r>
-          </a:p>
-        </p:txBody>
-      </p:sp>
-      <p:sp>
-        <p:nvSpPr>
-          <p:cNvPr id="5" name="Date Placeholder 4"/>
-          <p:cNvSpPr>
-            <a:spLocks noGrp="1"/>
-          </p:cNvSpPr>
-          <p:nvPr>
-            <p:ph type="dt" sz="half" idx="10"/>
-          </p:nvPr>
-        </p:nvSpPr>
-        <p:spPr/>
-        <p:txBody>
-          <a:bodyPr/>
-          <a:lstStyle/>
-          <a:p>
-            <a:fld id="{532E3D2B-DE49-4F26-AD30-F1E36EDC6A10}" type="datetimeFigureOut">
-              <a:rPr lang="en-US" smtClean="0"/>
-              <a:t>9/9/2012</a:t>
-            </a:fld>
-            <a:endParaRPr lang="en-US"/>
-          </a:p>
-        </p:txBody>
-      </p:sp>
-      <p:sp>
-        <p:nvSpPr>
-          <p:cNvPr id="6" name="Footer Placeholder 5"/>
-          <p:cNvSpPr>
-            <a:spLocks noGrp="1"/>
-          </p:cNvSpPr>
-          <p:nvPr>
-            <p:ph type="ftr" sz="quarter" idx="11"/>
-          </p:nvPr>
-        </p:nvSpPr>
-        <p:spPr/>
-        <p:txBody>
-          <a:bodyPr/>
-          <a:lstStyle/>
-          <a:p>
-            <a:endParaRPr lang="en-US"/>
-          </a:p>
-        </p:txBody>
-      </p:sp>
-      <p:sp>
-        <p:nvSpPr>
-          <p:cNvPr id="7" name="Slide Number Placeholder 6"/>
-          <p:cNvSpPr>
-            <a:spLocks noGrp="1"/>
-          </p:cNvSpPr>
-          <p:nvPr>
-            <p:ph type="sldNum" sz="quarter" idx="12"/>
-          </p:nvPr>
-        </p:nvSpPr>
-        <p:spPr/>
-        <p:txBody>
-          <a:bodyPr/>
-          <a:lstStyle/>
-          <a:p>
-            <a:fld id="{35144028-314A-4539-B140-0625171852C6}" type="slidenum">
-              <a:rPr lang="en-US" smtClean="0"/>
-              <a:t>‹#›</a:t>
-            </a:fld>
-            <a:endParaRPr lang="en-US"/>
+            <a:r>
+              <a:rPr lang="en-US" smtClean="0"/>
+              <a:t>Click icon to add picture</a:t>
+            </a:r>
+            <a:endParaRPr lang="en-US" dirty="0"/>
           </a:p>
         </p:txBody>
       </p:sp>
     </p:spTree>
     <p:extLst>
       <p:ext uri="{BB962C8B-B14F-4D97-AF65-F5344CB8AC3E}">
-        <p14:creationId xmlns:p14="http://schemas.microsoft.com/office/powerpoint/2010/main" val="1269420706"/>
+        <p14:creationId xmlns:p14="http://schemas.microsoft.com/office/powerpoint/2010/main" val="2329548478"/>
       </p:ext>
     </p:extLst>
   </p:cSld>
   <p:clrMapOvr>
     <a:masterClrMapping/>
   </p:clrMapOvr>
+  <mc:AlternateContent xmlns:mc="http://schemas.openxmlformats.org/markup-compatibility/2006" xmlns:p14="http://schemas.microsoft.com/office/powerpoint/2010/main">
+    <mc:Choice Requires="p14">
+      <p:transition p14:dur="60">
+        <p:fade/>
+      </p:transition>
+    </mc:Choice>
+    <mc:Fallback xmlns="">
+      <p:transition>
+        <p:fade/>
+      </p:transition>
+    </mc:Fallback>
+  </mc:AlternateContent>
+  <p:timing>
+    <p:tnLst>
+      <p:par>
+        <p:cTn id="1" dur="indefinite" restart="never" nodeType="tmRoot"/>
+      </p:par>
+    </p:tnLst>
+  </p:timing>
 </p:sldLayout>
 </file>
 
@@ -2572,9 +3149,16 @@
 <p:sldMaster xmlns:a="http://schemas.openxmlformats.org/drawingml/2006/main" xmlns:r="http://schemas.openxmlformats.org/officeDocument/2006/relationships" xmlns:p="http://schemas.openxmlformats.org/presentationml/2006/main">
   <p:cSld>
     <p:bg>
-      <p:bgRef idx="1001">
-        <a:schemeClr val="bg1"/>
-      </p:bgRef>
+      <p:bgPr>
+        <a:blipFill dpi="0" rotWithShape="1">
+          <a:blip r:embed="rId13">
+            <a:lum/>
+          </a:blip>
+          <a:srcRect/>
+          <a:tile tx="0" ty="0" sx="100000" sy="100000" flip="none" algn="tl"/>
+        </a:blipFill>
+        <a:effectLst/>
+      </p:bgPr>
     </p:bg>
     <p:spTree>
       <p:nvGrpSpPr>
@@ -2602,47 +3186,62 @@
         </p:nvSpPr>
         <p:spPr>
           <a:xfrm>
-            <a:off x="457200" y="274638"/>
-            <a:ext cx="8229600" cy="1143000"/>
+            <a:off x="-76200" y="274639"/>
+            <a:ext cx="9296400" cy="1143000"/>
+          </a:xfrm>
+          <a:prstGeom prst="rect">
+            <a:avLst/>
+          </a:prstGeom>
+          <a:blipFill dpi="0" rotWithShape="1">
+            <a:blip r:embed="rId14"/>
+            <a:srcRect/>
+            <a:tile tx="0" ty="0" sx="100000" sy="100000" flip="none" algn="tl"/>
+          </a:blipFill>
+          <a:effectLst>
+            <a:glow rad="101600">
+              <a:srgbClr val="8A9AA1">
+                <a:alpha val="52000"/>
+              </a:srgbClr>
+            </a:glow>
+            <a:innerShdw blurRad="406400">
+              <a:prstClr val="black"/>
+            </a:innerShdw>
+          </a:effectLst>
+        </p:spPr>
+        <p:txBody>
+          <a:bodyPr vert="horz" lIns="91440" tIns="45720" rIns="91440" bIns="45720" rtlCol="0" anchor="ctr">
+            <a:normAutofit/>
+          </a:bodyPr>
+          <a:lstStyle/>
+          <a:p>
+            <a:r>
+              <a:rPr lang="en-US" dirty="0" smtClean="0"/>
+              <a:t>Click to edit Master title style</a:t>
+            </a:r>
+            <a:endParaRPr lang="en-US" dirty="0"/>
+          </a:p>
+        </p:txBody>
+      </p:sp>
+      <p:sp>
+        <p:nvSpPr>
+          <p:cNvPr id="3" name="Text Placeholder 2"/>
+          <p:cNvSpPr>
+            <a:spLocks noGrp="1"/>
+          </p:cNvSpPr>
+          <p:nvPr>
+            <p:ph type="body" idx="1"/>
+          </p:nvPr>
+        </p:nvSpPr>
+        <p:spPr>
+          <a:xfrm>
+            <a:off x="457200" y="1600200"/>
+            <a:ext cx="8229600" cy="4648200"/>
           </a:xfrm>
           <a:prstGeom prst="rect">
             <a:avLst/>
           </a:prstGeom>
         </p:spPr>
         <p:txBody>
-          <a:bodyPr vert="horz" lIns="91440" tIns="45720" rIns="91440" bIns="45720" rtlCol="0" anchor="ctr">
-            <a:normAutofit/>
-          </a:bodyPr>
-          <a:lstStyle/>
-          <a:p>
-            <a:r>
-              <a:rPr lang="en-US" smtClean="0"/>
-              <a:t>Click to edit Master title style</a:t>
-            </a:r>
-            <a:endParaRPr lang="en-US"/>
-          </a:p>
-        </p:txBody>
-      </p:sp>
-      <p:sp>
-        <p:nvSpPr>
-          <p:cNvPr id="3" name="Text Placeholder 2"/>
-          <p:cNvSpPr>
-            <a:spLocks noGrp="1"/>
-          </p:cNvSpPr>
-          <p:nvPr>
-            <p:ph type="body" idx="1"/>
-          </p:nvPr>
-        </p:nvSpPr>
-        <p:spPr>
-          <a:xfrm>
-            <a:off x="457200" y="1600200"/>
-            <a:ext cx="8229600" cy="4525963"/>
-          </a:xfrm>
-          <a:prstGeom prst="rect">
-            <a:avLst/>
-          </a:prstGeom>
-        </p:spPr>
-        <p:txBody>
           <a:bodyPr vert="horz" lIns="91440" tIns="45720" rIns="91440" bIns="45720" rtlCol="0">
             <a:normAutofit/>
           </a:bodyPr>
@@ -2681,7 +3280,7 @@
               <a:rPr lang="en-US" smtClean="0"/>
               <a:t>Fifth level</a:t>
             </a:r>
-            <a:endParaRPr lang="en-US"/>
+            <a:endParaRPr lang="en-US" dirty="0"/>
           </a:p>
         </p:txBody>
       </p:sp>
@@ -2697,7 +3296,7 @@
         </p:nvSpPr>
         <p:spPr>
           <a:xfrm>
-            <a:off x="457200" y="6356350"/>
+            <a:off x="457200" y="6356351"/>
             <a:ext cx="2133600" cy="365125"/>
           </a:xfrm>
           <a:prstGeom prst="rect">
@@ -2714,13 +3313,15 @@
                     <a:tint val="75000"/>
                   </a:schemeClr>
                 </a:solidFill>
+                <a:latin typeface="Helvetica LT Std Cond Light" pitchFamily="34" charset="0"/>
               </a:defRPr>
             </a:lvl1pPr>
           </a:lstStyle>
           <a:p>
-            <a:fld id="{532E3D2B-DE49-4F26-AD30-F1E36EDC6A10}" type="datetimeFigureOut">
-              <a:rPr lang="en-US" smtClean="0"/>
-              <a:t>9/9/2012</a:t>
+            <a:fld id="{2F5BB042-2B17-413A-8BB2-6FDBD0381532}" type="datetimeFigureOut">
+              <a:rPr lang="en-US" smtClean="0"/>
+              <a:pPr/>
+              <a:t>11/18/2012</a:t>
             </a:fld>
             <a:endParaRPr lang="en-US"/>
           </a:p>
@@ -2738,7 +3339,7 @@
         </p:nvSpPr>
         <p:spPr>
           <a:xfrm>
-            <a:off x="3124200" y="6356350"/>
+            <a:off x="3124200" y="6356351"/>
             <a:ext cx="2895600" cy="365125"/>
           </a:xfrm>
           <a:prstGeom prst="rect">
@@ -2755,6 +3356,7 @@
                     <a:tint val="75000"/>
                   </a:schemeClr>
                 </a:solidFill>
+                <a:latin typeface="Helvetica LT Std Cond Light" pitchFamily="34" charset="0"/>
               </a:defRPr>
             </a:lvl1pPr>
           </a:lstStyle>
@@ -2775,7 +3377,7 @@
         </p:nvSpPr>
         <p:spPr>
           <a:xfrm>
-            <a:off x="6553200" y="6356350"/>
+            <a:off x="6553200" y="6356351"/>
             <a:ext cx="2133600" cy="365125"/>
           </a:xfrm>
           <a:prstGeom prst="rect">
@@ -2792,39 +3394,144 @@
                     <a:tint val="75000"/>
                   </a:schemeClr>
                 </a:solidFill>
+                <a:latin typeface="Helvetica LT Std Cond Light" pitchFamily="34" charset="0"/>
               </a:defRPr>
             </a:lvl1pPr>
           </a:lstStyle>
           <a:p>
-            <a:fld id="{35144028-314A-4539-B140-0625171852C6}" type="slidenum">
-              <a:rPr lang="en-US" smtClean="0"/>
+            <a:fld id="{F130C7C2-E2F1-465B-8C07-FB00D7F0D149}" type="slidenum">
+              <a:rPr lang="en-US" smtClean="0"/>
+              <a:pPr/>
               <a:t>‹#›</a:t>
             </a:fld>
             <a:endParaRPr lang="en-US"/>
           </a:p>
         </p:txBody>
       </p:sp>
+      <p:cxnSp>
+        <p:nvCxnSpPr>
+          <p:cNvPr id="7" name="Straight Connector 6"/>
+          <p:cNvCxnSpPr/>
+          <p:nvPr/>
+        </p:nvCxnSpPr>
+        <p:spPr>
+          <a:xfrm>
+            <a:off x="-76200" y="-7488"/>
+            <a:ext cx="9296400" cy="0"/>
+          </a:xfrm>
+          <a:prstGeom prst="line">
+            <a:avLst/>
+          </a:prstGeom>
+          <a:ln>
+            <a:solidFill>
+              <a:schemeClr val="tx1"/>
+            </a:solidFill>
+          </a:ln>
+          <a:effectLst>
+            <a:glow rad="76200">
+              <a:srgbClr val="EF9CBB">
+                <a:alpha val="35000"/>
+              </a:srgbClr>
+            </a:glow>
+          </a:effectLst>
+        </p:spPr>
+        <p:style>
+          <a:lnRef idx="1">
+            <a:schemeClr val="accent1"/>
+          </a:lnRef>
+          <a:fillRef idx="0">
+            <a:schemeClr val="accent1"/>
+          </a:fillRef>
+          <a:effectRef idx="0">
+            <a:schemeClr val="accent1"/>
+          </a:effectRef>
+          <a:fontRef idx="minor">
+            <a:schemeClr val="tx1"/>
+          </a:fontRef>
+        </p:style>
+      </p:cxnSp>
+      <p:cxnSp>
+        <p:nvCxnSpPr>
+          <p:cNvPr id="8" name="Straight Connector 7"/>
+          <p:cNvCxnSpPr/>
+          <p:nvPr/>
+        </p:nvCxnSpPr>
+        <p:spPr>
+          <a:xfrm>
+            <a:off x="-76200" y="6867144"/>
+            <a:ext cx="9296400" cy="0"/>
+          </a:xfrm>
+          <a:prstGeom prst="line">
+            <a:avLst/>
+          </a:prstGeom>
+          <a:ln>
+            <a:solidFill>
+              <a:schemeClr val="tx1"/>
+            </a:solidFill>
+          </a:ln>
+          <a:effectLst>
+            <a:glow rad="101600">
+              <a:srgbClr val="535A98">
+                <a:alpha val="40000"/>
+              </a:srgbClr>
+            </a:glow>
+          </a:effectLst>
+        </p:spPr>
+        <p:style>
+          <a:lnRef idx="1">
+            <a:schemeClr val="accent1"/>
+          </a:lnRef>
+          <a:fillRef idx="0">
+            <a:schemeClr val="accent1"/>
+          </a:fillRef>
+          <a:effectRef idx="0">
+            <a:schemeClr val="accent1"/>
+          </a:effectRef>
+          <a:fontRef idx="minor">
+            <a:schemeClr val="tx1"/>
+          </a:fontRef>
+        </p:style>
+      </p:cxnSp>
     </p:spTree>
     <p:extLst>
       <p:ext uri="{BB962C8B-B14F-4D97-AF65-F5344CB8AC3E}">
-        <p14:creationId xmlns:p14="http://schemas.microsoft.com/office/powerpoint/2010/main" val="3630718785"/>
+        <p14:creationId xmlns:p14="http://schemas.microsoft.com/office/powerpoint/2010/main" val="3605198005"/>
       </p:ext>
     </p:extLst>
   </p:cSld>
   <p:clrMap bg1="lt1" tx1="dk1" bg2="lt2" tx2="dk2" accent1="accent1" accent2="accent2" accent3="accent3" accent4="accent4" accent5="accent5" accent6="accent6" hlink="hlink" folHlink="folHlink"/>
   <p:sldLayoutIdLst>
-    <p:sldLayoutId id="2147483649" r:id="rId1"/>
-    <p:sldLayoutId id="2147483650" r:id="rId2"/>
-    <p:sldLayoutId id="2147483651" r:id="rId3"/>
-    <p:sldLayoutId id="2147483652" r:id="rId4"/>
-    <p:sldLayoutId id="2147483653" r:id="rId5"/>
-    <p:sldLayoutId id="2147483654" r:id="rId6"/>
-    <p:sldLayoutId id="2147483655" r:id="rId7"/>
-    <p:sldLayoutId id="2147483656" r:id="rId8"/>
-    <p:sldLayoutId id="2147483657" r:id="rId9"/>
-    <p:sldLayoutId id="2147483658" r:id="rId10"/>
-    <p:sldLayoutId id="2147483659" r:id="rId11"/>
+    <p:sldLayoutId id="2147483673" r:id="rId1"/>
+    <p:sldLayoutId id="2147483674" r:id="rId2"/>
+    <p:sldLayoutId id="2147483675" r:id="rId3"/>
+    <p:sldLayoutId id="2147483676" r:id="rId4"/>
+    <p:sldLayoutId id="2147483677" r:id="rId5"/>
+    <p:sldLayoutId id="2147483678" r:id="rId6"/>
+    <p:sldLayoutId id="2147483679" r:id="rId7"/>
+    <p:sldLayoutId id="2147483680" r:id="rId8"/>
+    <p:sldLayoutId id="2147483681" r:id="rId9"/>
+    <p:sldLayoutId id="2147483682" r:id="rId10"/>
+    <p:sldLayoutId id="2147483683" r:id="rId11"/>
   </p:sldLayoutIdLst>
+  <mc:AlternateContent xmlns:mc="http://schemas.openxmlformats.org/markup-compatibility/2006" xmlns:p14="http://schemas.microsoft.com/office/powerpoint/2010/main">
+    <mc:Choice Requires="p14">
+      <p:transition p14:dur="60">
+        <p:fade/>
+      </p:transition>
+    </mc:Choice>
+    <mc:Fallback xmlns="">
+      <p:transition>
+        <p:fade/>
+      </p:transition>
+    </mc:Fallback>
+  </mc:AlternateContent>
+  <p:timing>
+    <p:tnLst>
+      <p:par>
+        <p:cTn id="1" dur="indefinite" restart="never" nodeType="tmRoot"/>
+      </p:par>
+    </p:tnLst>
+  </p:timing>
   <p:txStyles>
     <p:titleStyle>
       <a:lvl1pPr algn="ctr" defTabSz="914400" rtl="0" eaLnBrk="1" latinLnBrk="0" hangingPunct="1">
@@ -2832,12 +3539,19 @@
           <a:spcPct val="0"/>
         </a:spcBef>
         <a:buNone/>
-        <a:defRPr sz="4400" kern="1200">
+        <a:defRPr sz="3200" kern="1200" cap="all" spc="300" baseline="0">
           <a:solidFill>
-            <a:schemeClr val="tx1"/>
+            <a:schemeClr val="bg1"/>
           </a:solidFill>
-          <a:latin typeface="+mj-lt"/>
-          <a:ea typeface="+mj-ea"/>
+          <a:effectLst>
+            <a:outerShdw blurRad="38100" dist="38100" dir="2700000" algn="tl">
+              <a:srgbClr val="000000">
+                <a:alpha val="43137"/>
+              </a:srgbClr>
+            </a:outerShdw>
+          </a:effectLst>
+          <a:latin typeface="Roboto Lt" pitchFamily="2" charset="0"/>
+          <a:ea typeface="Roboto Lt" pitchFamily="2" charset="0"/>
           <a:cs typeface="+mj-cs"/>
         </a:defRPr>
       </a:lvl1pPr>
@@ -2847,75 +3561,85 @@
         <a:spcBef>
           <a:spcPct val="20000"/>
         </a:spcBef>
-        <a:buFont typeface="Arial" pitchFamily="34" charset="0"/>
-        <a:buChar char="•"/>
+        <a:buFontTx/>
+        <a:buBlip>
+          <a:blip r:embed="rId15"/>
+        </a:buBlip>
         <a:defRPr sz="3200" kern="1200">
           <a:solidFill>
-            <a:schemeClr val="tx1"/>
+            <a:srgbClr val="677379"/>
           </a:solidFill>
-          <a:latin typeface="+mn-lt"/>
-          <a:ea typeface="+mn-ea"/>
-          <a:cs typeface="+mn-cs"/>
+          <a:latin typeface="Roboto Lt" pitchFamily="2" charset="0"/>
+          <a:ea typeface="Roboto Lt" pitchFamily="2" charset="0"/>
+          <a:cs typeface="Droid Sans" pitchFamily="34" charset="0"/>
         </a:defRPr>
       </a:lvl1pPr>
       <a:lvl2pPr marL="742950" indent="-285750" algn="l" defTabSz="914400" rtl="0" eaLnBrk="1" latinLnBrk="0" hangingPunct="1">
         <a:spcBef>
           <a:spcPct val="20000"/>
         </a:spcBef>
-        <a:buFont typeface="Arial" pitchFamily="34" charset="0"/>
-        <a:buChar char="–"/>
+        <a:buFontTx/>
+        <a:buBlip>
+          <a:blip r:embed="rId16"/>
+        </a:buBlip>
         <a:defRPr sz="2800" kern="1200">
           <a:solidFill>
-            <a:schemeClr val="tx1"/>
+            <a:srgbClr val="677379"/>
           </a:solidFill>
-          <a:latin typeface="+mn-lt"/>
-          <a:ea typeface="+mn-ea"/>
-          <a:cs typeface="+mn-cs"/>
+          <a:latin typeface="Roboto Lt" pitchFamily="2" charset="0"/>
+          <a:ea typeface="Roboto Lt" pitchFamily="2" charset="0"/>
+          <a:cs typeface="Droid Sans" pitchFamily="34" charset="0"/>
         </a:defRPr>
       </a:lvl2pPr>
       <a:lvl3pPr marL="1143000" indent="-228600" algn="l" defTabSz="914400" rtl="0" eaLnBrk="1" latinLnBrk="0" hangingPunct="1">
         <a:spcBef>
           <a:spcPct val="20000"/>
         </a:spcBef>
-        <a:buFont typeface="Arial" pitchFamily="34" charset="0"/>
-        <a:buChar char="•"/>
+        <a:buFontTx/>
+        <a:buBlip>
+          <a:blip r:embed="rId17"/>
+        </a:buBlip>
         <a:defRPr sz="2400" kern="1200">
           <a:solidFill>
-            <a:schemeClr val="tx1"/>
+            <a:srgbClr val="677379"/>
           </a:solidFill>
-          <a:latin typeface="+mn-lt"/>
-          <a:ea typeface="+mn-ea"/>
-          <a:cs typeface="+mn-cs"/>
+          <a:latin typeface="Roboto Lt" pitchFamily="2" charset="0"/>
+          <a:ea typeface="Roboto Lt" pitchFamily="2" charset="0"/>
+          <a:cs typeface="Droid Sans" pitchFamily="34" charset="0"/>
         </a:defRPr>
       </a:lvl3pPr>
       <a:lvl4pPr marL="1600200" indent="-228600" algn="l" defTabSz="914400" rtl="0" eaLnBrk="1" latinLnBrk="0" hangingPunct="1">
         <a:spcBef>
           <a:spcPct val="20000"/>
         </a:spcBef>
-        <a:buFont typeface="Arial" pitchFamily="34" charset="0"/>
-        <a:buChar char="–"/>
+        <a:buFontTx/>
+        <a:buBlip>
+          <a:blip r:embed="rId18"/>
+        </a:buBlip>
         <a:defRPr sz="2000" kern="1200">
           <a:solidFill>
-            <a:schemeClr val="tx1"/>
+            <a:srgbClr val="677379"/>
           </a:solidFill>
-          <a:latin typeface="+mn-lt"/>
-          <a:ea typeface="+mn-ea"/>
-          <a:cs typeface="+mn-cs"/>
+          <a:latin typeface="Roboto Lt" pitchFamily="2" charset="0"/>
+          <a:ea typeface="Roboto Lt" pitchFamily="2" charset="0"/>
+          <a:cs typeface="Droid Sans" pitchFamily="34" charset="0"/>
         </a:defRPr>
       </a:lvl4pPr>
       <a:lvl5pPr marL="2057400" indent="-228600" algn="l" defTabSz="914400" rtl="0" eaLnBrk="1" latinLnBrk="0" hangingPunct="1">
         <a:spcBef>
           <a:spcPct val="20000"/>
         </a:spcBef>
-        <a:buFont typeface="Arial" pitchFamily="34" charset="0"/>
-        <a:buChar char="»"/>
+        <a:buFontTx/>
+        <a:buBlip>
+          <a:blip r:embed="rId19"/>
+        </a:buBlip>
         <a:defRPr sz="2000" kern="1200">
           <a:solidFill>
-            <a:schemeClr val="tx1"/>
+            <a:srgbClr val="677379"/>
           </a:solidFill>
-          <a:latin typeface="+mn-lt"/>
-          <a:ea typeface="+mn-ea"/>
-          <a:cs typeface="+mn-cs"/>
+          <a:latin typeface="Roboto Lt" pitchFamily="2" charset="0"/>
+          <a:ea typeface="Roboto Lt" pitchFamily="2" charset="0"/>
+          <a:cs typeface="Droid Sans" pitchFamily="34" charset="0"/>
         </a:defRPr>
       </a:lvl5pPr>
       <a:lvl6pPr marL="2514600" indent="-228600" algn="l" defTabSz="914400" rtl="0" eaLnBrk="1" latinLnBrk="0" hangingPunct="1">
@@ -3095,58 +3819,1391 @@
           <a:chExt cx="0" cy="0"/>
         </a:xfrm>
       </p:grpSpPr>
-      <p:sp>
-        <p:nvSpPr>
-          <p:cNvPr id="2" name="Title 1"/>
-          <p:cNvSpPr>
-            <a:spLocks noGrp="1"/>
-          </p:cNvSpPr>
-          <p:nvPr>
-            <p:ph type="ctrTitle"/>
-          </p:nvPr>
-        </p:nvSpPr>
-        <p:spPr/>
-        <p:txBody>
-          <a:bodyPr/>
-          <a:lstStyle/>
-          <a:p>
-            <a:endParaRPr lang="en-US"/>
-          </a:p>
-        </p:txBody>
-      </p:sp>
-      <p:sp>
-        <p:nvSpPr>
-          <p:cNvPr id="3" name="Subtitle 2"/>
-          <p:cNvSpPr>
-            <a:spLocks noGrp="1"/>
-          </p:cNvSpPr>
-          <p:nvPr>
-            <p:ph type="subTitle" idx="1"/>
-          </p:nvPr>
-        </p:nvSpPr>
-        <p:spPr/>
-        <p:txBody>
-          <a:bodyPr/>
-          <a:lstStyle/>
-          <a:p>
-            <a:endParaRPr lang="en-US"/>
-          </a:p>
-        </p:txBody>
-      </p:sp>
+      <p:pic>
+        <p:nvPicPr>
+          <p:cNvPr id="11" name="Picture 10"/>
+          <p:cNvPicPr>
+            <a:picLocks noChangeAspect="1"/>
+          </p:cNvPicPr>
+          <p:nvPr/>
+        </p:nvPicPr>
+        <p:blipFill>
+          <a:blip r:embed="rId2">
+            <a:extLst>
+              <a:ext uri="{28A0092B-C50C-407E-A947-70E740481C1C}">
+                <a14:useLocalDpi xmlns:a14="http://schemas.microsoft.com/office/drawing/2010/main" val="0"/>
+              </a:ext>
+            </a:extLst>
+          </a:blip>
+          <a:stretch>
+            <a:fillRect/>
+          </a:stretch>
+        </p:blipFill>
+        <p:spPr>
+          <a:xfrm>
+            <a:off x="533400" y="495300"/>
+            <a:ext cx="8077200" cy="4038600"/>
+          </a:xfrm>
+          <a:prstGeom prst="rect">
+            <a:avLst/>
+          </a:prstGeom>
+          <a:effectLst>
+            <a:outerShdw blurRad="152400" dist="38100" dir="5400000" algn="t" rotWithShape="0">
+              <a:prstClr val="black">
+                <a:alpha val="28000"/>
+              </a:prstClr>
+            </a:outerShdw>
+          </a:effectLst>
+        </p:spPr>
+      </p:pic>
+      <p:grpSp>
+        <p:nvGrpSpPr>
+          <p:cNvPr id="20" name="Group 19"/>
+          <p:cNvGrpSpPr/>
+          <p:nvPr/>
+        </p:nvGrpSpPr>
+        <p:grpSpPr>
+          <a:xfrm>
+            <a:off x="752714" y="5222557"/>
+            <a:ext cx="7638572" cy="1106508"/>
+            <a:chOff x="457200" y="5222557"/>
+            <a:chExt cx="7638572" cy="1106508"/>
+          </a:xfrm>
+        </p:grpSpPr>
+        <p:sp>
+          <p:nvSpPr>
+            <p:cNvPr id="13" name="TextBox 12"/>
+            <p:cNvSpPr txBox="1"/>
+            <p:nvPr/>
+          </p:nvSpPr>
+          <p:spPr>
+            <a:xfrm>
+              <a:off x="3176707" y="5222557"/>
+              <a:ext cx="2743200" cy="492443"/>
+            </a:xfrm>
+            <a:prstGeom prst="rect">
+              <a:avLst/>
+            </a:prstGeom>
+            <a:noFill/>
+            <a:effectLst>
+              <a:outerShdw blurRad="63500" sx="102000" sy="102000" algn="ctr" rotWithShape="0">
+                <a:srgbClr val="677379">
+                  <a:alpha val="40000"/>
+                </a:srgbClr>
+              </a:outerShdw>
+            </a:effectLst>
+          </p:spPr>
+          <p:txBody>
+            <a:bodyPr wrap="square" rtlCol="0">
+              <a:spAutoFit/>
+            </a:bodyPr>
+            <a:lstStyle/>
+            <a:p>
+              <a:pPr algn="ctr"/>
+              <a:r>
+                <a:rPr lang="en-US" sz="2600" dirty="0" smtClean="0">
+                  <a:solidFill>
+                    <a:srgbClr val="8A9AA1"/>
+                  </a:solidFill>
+                  <a:latin typeface="Roboto Lt" pitchFamily="2" charset="0"/>
+                  <a:ea typeface="Roboto Lt" pitchFamily="2" charset="0"/>
+                </a:rPr>
+                <a:t>Charles </a:t>
+              </a:r>
+              <a:r>
+                <a:rPr lang="en-US" sz="2600" dirty="0" err="1" smtClean="0">
+                  <a:solidFill>
+                    <a:srgbClr val="8A9AA1"/>
+                  </a:solidFill>
+                  <a:latin typeface="Roboto Lt" pitchFamily="2" charset="0"/>
+                  <a:ea typeface="Roboto Lt" pitchFamily="2" charset="0"/>
+                </a:rPr>
+                <a:t>Madere</a:t>
+              </a:r>
+              <a:endParaRPr lang="en-US" sz="2600" dirty="0">
+                <a:solidFill>
+                  <a:srgbClr val="8A9AA1"/>
+                </a:solidFill>
+                <a:latin typeface="Roboto Lt" pitchFamily="2" charset="0"/>
+                <a:ea typeface="Roboto Lt" pitchFamily="2" charset="0"/>
+              </a:endParaRPr>
+            </a:p>
+          </p:txBody>
+        </p:sp>
+        <p:sp>
+          <p:nvSpPr>
+            <p:cNvPr id="14" name="TextBox 13"/>
+            <p:cNvSpPr txBox="1"/>
+            <p:nvPr/>
+          </p:nvSpPr>
+          <p:spPr>
+            <a:xfrm>
+              <a:off x="457200" y="5253335"/>
+              <a:ext cx="2743200" cy="461665"/>
+            </a:xfrm>
+            <a:prstGeom prst="rect">
+              <a:avLst/>
+            </a:prstGeom>
+            <a:noFill/>
+          </p:spPr>
+          <p:txBody>
+            <a:bodyPr wrap="square" rtlCol="0">
+              <a:spAutoFit/>
+            </a:bodyPr>
+            <a:lstStyle/>
+            <a:p>
+              <a:pPr algn="ctr"/>
+              <a:r>
+                <a:rPr lang="en-US" sz="2400" dirty="0" err="1" smtClean="0">
+                  <a:solidFill>
+                    <a:srgbClr val="8A9AA1"/>
+                  </a:solidFill>
+                  <a:latin typeface="Roboto Lt" pitchFamily="2" charset="0"/>
+                  <a:ea typeface="Roboto Lt" pitchFamily="2" charset="0"/>
+                </a:rPr>
+                <a:t>Geonathan</a:t>
+              </a:r>
+              <a:r>
+                <a:rPr lang="en-US" sz="2400" dirty="0" smtClean="0">
+                  <a:solidFill>
+                    <a:srgbClr val="8A9AA1"/>
+                  </a:solidFill>
+                  <a:latin typeface="Roboto Lt" pitchFamily="2" charset="0"/>
+                  <a:ea typeface="Roboto Lt" pitchFamily="2" charset="0"/>
+                </a:rPr>
+                <a:t> </a:t>
+              </a:r>
+              <a:r>
+                <a:rPr lang="en-US" sz="2400" dirty="0" err="1" smtClean="0">
+                  <a:solidFill>
+                    <a:srgbClr val="8A9AA1"/>
+                  </a:solidFill>
+                  <a:latin typeface="Roboto Lt" pitchFamily="2" charset="0"/>
+                  <a:ea typeface="Roboto Lt" pitchFamily="2" charset="0"/>
+                </a:rPr>
+                <a:t>Sena</a:t>
+              </a:r>
+              <a:endParaRPr lang="en-US" sz="2400" dirty="0">
+                <a:solidFill>
+                  <a:srgbClr val="8A9AA1"/>
+                </a:solidFill>
+                <a:latin typeface="Roboto Lt" pitchFamily="2" charset="0"/>
+                <a:ea typeface="Roboto Lt" pitchFamily="2" charset="0"/>
+              </a:endParaRPr>
+            </a:p>
+          </p:txBody>
+        </p:sp>
+        <p:sp>
+          <p:nvSpPr>
+            <p:cNvPr id="15" name="TextBox 14"/>
+            <p:cNvSpPr txBox="1"/>
+            <p:nvPr/>
+          </p:nvSpPr>
+          <p:spPr>
+            <a:xfrm>
+              <a:off x="5867400" y="5253335"/>
+              <a:ext cx="2228372" cy="461665"/>
+            </a:xfrm>
+            <a:prstGeom prst="rect">
+              <a:avLst/>
+            </a:prstGeom>
+            <a:noFill/>
+          </p:spPr>
+          <p:txBody>
+            <a:bodyPr wrap="square" rtlCol="0">
+              <a:spAutoFit/>
+            </a:bodyPr>
+            <a:lstStyle/>
+            <a:p>
+              <a:pPr algn="ctr"/>
+              <a:r>
+                <a:rPr lang="en-US" sz="2400" dirty="0" err="1" smtClean="0">
+                  <a:solidFill>
+                    <a:srgbClr val="8A9AA1"/>
+                  </a:solidFill>
+                  <a:latin typeface="Roboto Lt" pitchFamily="2" charset="0"/>
+                  <a:ea typeface="Roboto Lt" pitchFamily="2" charset="0"/>
+                </a:rPr>
+                <a:t>Suvan</a:t>
+              </a:r>
+              <a:r>
+                <a:rPr lang="en-US" sz="2400" dirty="0" smtClean="0">
+                  <a:solidFill>
+                    <a:srgbClr val="8A9AA1"/>
+                  </a:solidFill>
+                  <a:latin typeface="Roboto Lt" pitchFamily="2" charset="0"/>
+                  <a:ea typeface="Roboto Lt" pitchFamily="2" charset="0"/>
+                </a:rPr>
+                <a:t> Dixit</a:t>
+              </a:r>
+              <a:endParaRPr lang="en-US" sz="2400" dirty="0">
+                <a:solidFill>
+                  <a:srgbClr val="8A9AA1"/>
+                </a:solidFill>
+                <a:latin typeface="Roboto Lt" pitchFamily="2" charset="0"/>
+                <a:ea typeface="Roboto Lt" pitchFamily="2" charset="0"/>
+              </a:endParaRPr>
+            </a:p>
+          </p:txBody>
+        </p:sp>
+        <p:sp>
+          <p:nvSpPr>
+            <p:cNvPr id="17" name="TextBox 16"/>
+            <p:cNvSpPr txBox="1"/>
+            <p:nvPr/>
+          </p:nvSpPr>
+          <p:spPr>
+            <a:xfrm>
+              <a:off x="1600200" y="5867400"/>
+              <a:ext cx="2743200" cy="461665"/>
+            </a:xfrm>
+            <a:prstGeom prst="rect">
+              <a:avLst/>
+            </a:prstGeom>
+            <a:noFill/>
+          </p:spPr>
+          <p:txBody>
+            <a:bodyPr wrap="square" rtlCol="0">
+              <a:spAutoFit/>
+            </a:bodyPr>
+            <a:lstStyle/>
+            <a:p>
+              <a:pPr algn="ctr"/>
+              <a:r>
+                <a:rPr lang="en-US" sz="2400" dirty="0" err="1" smtClean="0">
+                  <a:solidFill>
+                    <a:srgbClr val="8A9AA1"/>
+                  </a:solidFill>
+                  <a:latin typeface="Roboto Lt" pitchFamily="2" charset="0"/>
+                  <a:ea typeface="Roboto Lt" pitchFamily="2" charset="0"/>
+                </a:rPr>
+                <a:t>Jarrad</a:t>
+              </a:r>
+              <a:r>
+                <a:rPr lang="en-US" sz="2400" dirty="0" smtClean="0">
+                  <a:solidFill>
+                    <a:srgbClr val="8A9AA1"/>
+                  </a:solidFill>
+                  <a:latin typeface="Roboto Lt" pitchFamily="2" charset="0"/>
+                  <a:ea typeface="Roboto Lt" pitchFamily="2" charset="0"/>
+                </a:rPr>
+                <a:t> </a:t>
+              </a:r>
+              <a:r>
+                <a:rPr lang="en-US" sz="2400" dirty="0" err="1" smtClean="0">
+                  <a:solidFill>
+                    <a:srgbClr val="8A9AA1"/>
+                  </a:solidFill>
+                  <a:latin typeface="Roboto Lt" pitchFamily="2" charset="0"/>
+                  <a:ea typeface="Roboto Lt" pitchFamily="2" charset="0"/>
+                </a:rPr>
+                <a:t>Pinestraw</a:t>
+              </a:r>
+              <a:endParaRPr lang="en-US" sz="2400" dirty="0">
+                <a:solidFill>
+                  <a:srgbClr val="8A9AA1"/>
+                </a:solidFill>
+                <a:latin typeface="Roboto Lt" pitchFamily="2" charset="0"/>
+                <a:ea typeface="Roboto Lt" pitchFamily="2" charset="0"/>
+              </a:endParaRPr>
+            </a:p>
+          </p:txBody>
+        </p:sp>
+        <p:sp>
+          <p:nvSpPr>
+            <p:cNvPr id="18" name="TextBox 17"/>
+            <p:cNvSpPr txBox="1"/>
+            <p:nvPr/>
+          </p:nvSpPr>
+          <p:spPr>
+            <a:xfrm>
+              <a:off x="4572000" y="5867400"/>
+              <a:ext cx="2743200" cy="461665"/>
+            </a:xfrm>
+            <a:prstGeom prst="rect">
+              <a:avLst/>
+            </a:prstGeom>
+            <a:noFill/>
+          </p:spPr>
+          <p:txBody>
+            <a:bodyPr wrap="square" rtlCol="0">
+              <a:spAutoFit/>
+            </a:bodyPr>
+            <a:lstStyle/>
+            <a:p>
+              <a:pPr algn="ctr"/>
+              <a:r>
+                <a:rPr lang="en-US" sz="2400" dirty="0" smtClean="0">
+                  <a:solidFill>
+                    <a:srgbClr val="8A9AA1"/>
+                  </a:solidFill>
+                  <a:latin typeface="Roboto Lt" pitchFamily="2" charset="0"/>
+                  <a:ea typeface="Roboto Lt" pitchFamily="2" charset="0"/>
+                </a:rPr>
+                <a:t>Tristan Kidder</a:t>
+              </a:r>
+              <a:endParaRPr lang="en-US" sz="2400" dirty="0">
+                <a:solidFill>
+                  <a:srgbClr val="8A9AA1"/>
+                </a:solidFill>
+                <a:latin typeface="Roboto Lt" pitchFamily="2" charset="0"/>
+                <a:ea typeface="Roboto Lt" pitchFamily="2" charset="0"/>
+              </a:endParaRPr>
+            </a:p>
+          </p:txBody>
+        </p:sp>
+      </p:grpSp>
     </p:spTree>
     <p:extLst>
       <p:ext uri="{BB962C8B-B14F-4D97-AF65-F5344CB8AC3E}">
-        <p14:creationId xmlns:p14="http://schemas.microsoft.com/office/powerpoint/2010/main" val="687380925"/>
+        <p14:creationId xmlns:p14="http://schemas.microsoft.com/office/powerpoint/2010/main" val="3279529397"/>
       </p:ext>
     </p:extLst>
   </p:cSld>
   <p:clrMapOvr>
     <a:masterClrMapping/>
   </p:clrMapOvr>
+  <mc:AlternateContent xmlns:mc="http://schemas.openxmlformats.org/markup-compatibility/2006" xmlns:p14="http://schemas.microsoft.com/office/powerpoint/2010/main">
+    <mc:Choice Requires="p14">
+      <p:transition p14:dur="60">
+        <p:fade/>
+      </p:transition>
+    </mc:Choice>
+    <mc:Fallback xmlns="">
+      <p:transition>
+        <p:fade/>
+      </p:transition>
+    </mc:Fallback>
+  </mc:AlternateContent>
+  <p:timing>
+    <p:tnLst>
+      <p:par>
+        <p:cTn id="1" dur="indefinite" restart="never" nodeType="tmRoot"/>
+      </p:par>
+    </p:tnLst>
+  </p:timing>
+</p:sld>
+</file>
+
+<file path=ppt/slides/slide2.xml><?xml version="1.0" encoding="utf-8"?>
+<p:sld xmlns:a="http://schemas.openxmlformats.org/drawingml/2006/main" xmlns:r="http://schemas.openxmlformats.org/officeDocument/2006/relationships" xmlns:p="http://schemas.openxmlformats.org/presentationml/2006/main">
+  <p:cSld>
+    <p:spTree>
+      <p:nvGrpSpPr>
+        <p:cNvPr id="1" name=""/>
+        <p:cNvGrpSpPr/>
+        <p:nvPr/>
+      </p:nvGrpSpPr>
+      <p:grpSpPr>
+        <a:xfrm>
+          <a:off x="0" y="0"/>
+          <a:ext cx="0" cy="0"/>
+          <a:chOff x="0" y="0"/>
+          <a:chExt cx="0" cy="0"/>
+        </a:xfrm>
+      </p:grpSpPr>
+      <p:sp>
+        <p:nvSpPr>
+          <p:cNvPr id="2" name="Title 1"/>
+          <p:cNvSpPr>
+            <a:spLocks noGrp="1"/>
+          </p:cNvSpPr>
+          <p:nvPr>
+            <p:ph type="title"/>
+          </p:nvPr>
+        </p:nvSpPr>
+        <p:spPr/>
+        <p:txBody>
+          <a:bodyPr/>
+          <a:lstStyle/>
+          <a:p>
+            <a:r>
+              <a:rPr lang="en-US" dirty="0" smtClean="0"/>
+              <a:t>our p</a:t>
+            </a:r>
+            <a:r>
+              <a:rPr lang="en-US" spc="0" dirty="0" smtClean="0"/>
+              <a:t>r</a:t>
+            </a:r>
+            <a:r>
+              <a:rPr lang="en-US" dirty="0" smtClean="0"/>
+              <a:t>oject is</a:t>
+            </a:r>
+            <a:endParaRPr lang="en-US" dirty="0"/>
+          </a:p>
+        </p:txBody>
+      </p:sp>
+      <p:sp>
+        <p:nvSpPr>
+          <p:cNvPr id="3" name="Content Placeholder 2"/>
+          <p:cNvSpPr>
+            <a:spLocks noGrp="1"/>
+          </p:cNvSpPr>
+          <p:nvPr>
+            <p:ph idx="1"/>
+          </p:nvPr>
+        </p:nvSpPr>
+        <p:spPr>
+          <a:xfrm>
+            <a:off x="457200" y="1600200"/>
+            <a:ext cx="8229600" cy="5257800"/>
+          </a:xfrm>
+        </p:spPr>
+        <p:txBody>
+          <a:bodyPr>
+            <a:normAutofit/>
+          </a:bodyPr>
+          <a:lstStyle/>
+          <a:p>
+            <a:r>
+              <a:rPr lang="en-US" dirty="0" smtClean="0"/>
+              <a:t>A natively built Android application</a:t>
+            </a:r>
+          </a:p>
+          <a:p>
+            <a:r>
+              <a:rPr lang="en-US" dirty="0" smtClean="0"/>
+              <a:t>Socially connected with the Facebook SDK</a:t>
+            </a:r>
+          </a:p>
+          <a:p>
+            <a:r>
+              <a:rPr lang="en-US" dirty="0" smtClean="0"/>
+              <a:t>Cloud powered with Amazon Web Services</a:t>
+            </a:r>
+          </a:p>
+          <a:p>
+            <a:r>
+              <a:rPr lang="en-US" dirty="0" smtClean="0"/>
+              <a:t>Designed with newer Android devices in mind</a:t>
+            </a:r>
+          </a:p>
+          <a:p>
+            <a:pPr lvl="1"/>
+            <a:r>
+              <a:rPr lang="en-US" dirty="0" smtClean="0"/>
+              <a:t>Follows Android 3.0+ design guidelines</a:t>
+            </a:r>
+          </a:p>
+          <a:p>
+            <a:pPr lvl="2"/>
+            <a:r>
+              <a:rPr lang="en-US" dirty="0" smtClean="0"/>
+              <a:t>No hardware buttons required through the use of the new Android Action Bar</a:t>
+            </a:r>
+          </a:p>
+          <a:p>
+            <a:pPr lvl="1"/>
+            <a:r>
+              <a:rPr lang="en-US" dirty="0" smtClean="0"/>
+              <a:t>Compatible with older Android 2.3.3 devices thanks to </a:t>
+            </a:r>
+            <a:r>
+              <a:rPr lang="en-US" dirty="0" err="1" smtClean="0"/>
+              <a:t>ActionBarSherlock</a:t>
+            </a:r>
+            <a:endParaRPr lang="en-US" dirty="0" smtClean="0"/>
+          </a:p>
+        </p:txBody>
+      </p:sp>
+    </p:spTree>
+    <p:extLst>
+      <p:ext uri="{BB962C8B-B14F-4D97-AF65-F5344CB8AC3E}">
+        <p14:creationId xmlns:p14="http://schemas.microsoft.com/office/powerpoint/2010/main" val="413463721"/>
+      </p:ext>
+    </p:extLst>
+  </p:cSld>
+  <p:clrMapOvr>
+    <a:masterClrMapping/>
+  </p:clrMapOvr>
+  <mc:AlternateContent xmlns:mc="http://schemas.openxmlformats.org/markup-compatibility/2006" xmlns:p14="http://schemas.microsoft.com/office/powerpoint/2010/main">
+    <mc:Choice Requires="p14">
+      <p:transition p14:dur="60">
+        <p:fade/>
+      </p:transition>
+    </mc:Choice>
+    <mc:Fallback xmlns="">
+      <p:transition>
+        <p:fade/>
+      </p:transition>
+    </mc:Fallback>
+  </mc:AlternateContent>
+  <p:timing>
+    <p:tnLst>
+      <p:par>
+        <p:cTn id="1" dur="indefinite" restart="never" nodeType="tmRoot"/>
+      </p:par>
+    </p:tnLst>
+  </p:timing>
+</p:sld>
+</file>
+
+<file path=ppt/slides/slide3.xml><?xml version="1.0" encoding="utf-8"?>
+<p:sld xmlns:a="http://schemas.openxmlformats.org/drawingml/2006/main" xmlns:r="http://schemas.openxmlformats.org/officeDocument/2006/relationships" xmlns:p="http://schemas.openxmlformats.org/presentationml/2006/main">
+  <p:cSld>
+    <p:spTree>
+      <p:nvGrpSpPr>
+        <p:cNvPr id="1" name=""/>
+        <p:cNvGrpSpPr/>
+        <p:nvPr/>
+      </p:nvGrpSpPr>
+      <p:grpSpPr>
+        <a:xfrm>
+          <a:off x="0" y="0"/>
+          <a:ext cx="0" cy="0"/>
+          <a:chOff x="0" y="0"/>
+          <a:chExt cx="0" cy="0"/>
+        </a:xfrm>
+      </p:grpSpPr>
+      <p:sp>
+        <p:nvSpPr>
+          <p:cNvPr id="2" name="Title 1"/>
+          <p:cNvSpPr>
+            <a:spLocks noGrp="1"/>
+          </p:cNvSpPr>
+          <p:nvPr>
+            <p:ph type="title"/>
+          </p:nvPr>
+        </p:nvSpPr>
+        <p:spPr/>
+        <p:txBody>
+          <a:bodyPr/>
+          <a:lstStyle/>
+          <a:p>
+            <a:r>
+              <a:rPr lang="en-US" dirty="0" smtClean="0"/>
+              <a:t>technology and te</a:t>
+            </a:r>
+            <a:r>
+              <a:rPr lang="en-US" spc="0" dirty="0" smtClean="0"/>
+              <a:t>r</a:t>
+            </a:r>
+            <a:r>
+              <a:rPr lang="en-US" dirty="0" smtClean="0"/>
+              <a:t>minology</a:t>
+            </a:r>
+            <a:endParaRPr lang="en-US" dirty="0"/>
+          </a:p>
+        </p:txBody>
+      </p:sp>
+      <p:sp>
+        <p:nvSpPr>
+          <p:cNvPr id="5" name="Content Placeholder 4"/>
+          <p:cNvSpPr>
+            <a:spLocks noGrp="1"/>
+          </p:cNvSpPr>
+          <p:nvPr>
+            <p:ph sz="half" idx="2"/>
+          </p:nvPr>
+        </p:nvSpPr>
+        <p:spPr>
+          <a:xfrm>
+            <a:off x="76200" y="1524001"/>
+            <a:ext cx="5791200" cy="5333999"/>
+          </a:xfrm>
+        </p:spPr>
+        <p:txBody>
+          <a:bodyPr wrap="square">
+            <a:normAutofit fontScale="92500" lnSpcReduction="20000"/>
+          </a:bodyPr>
+          <a:lstStyle/>
+          <a:p>
+            <a:pPr>
+              <a:lnSpc>
+                <a:spcPct val="120000"/>
+              </a:lnSpc>
+            </a:pPr>
+            <a:r>
+              <a:rPr lang="en-US" dirty="0" smtClean="0">
+                <a:latin typeface="Roboto" pitchFamily="2" charset="0"/>
+                <a:ea typeface="Roboto" pitchFamily="2" charset="0"/>
+              </a:rPr>
+              <a:t>Amazon Web Services</a:t>
+            </a:r>
+            <a:r>
+              <a:rPr lang="en-US" dirty="0" smtClean="0"/>
+              <a:t> is a large collection of remote computing services</a:t>
+            </a:r>
+          </a:p>
+          <a:p>
+            <a:pPr lvl="1">
+              <a:lnSpc>
+                <a:spcPct val="120000"/>
+              </a:lnSpc>
+            </a:pPr>
+            <a:r>
+              <a:rPr lang="en-US" dirty="0" smtClean="0"/>
+              <a:t>Most well known of their services are Amazon S3 and Amazon EC2</a:t>
+            </a:r>
+          </a:p>
+          <a:p>
+            <a:pPr lvl="1">
+              <a:lnSpc>
+                <a:spcPct val="120000"/>
+              </a:lnSpc>
+            </a:pPr>
+            <a:r>
+              <a:rPr lang="en-US" dirty="0" smtClean="0"/>
+              <a:t>We are using a tier that is free for one year as long as we don’t exceed a certain monthly usage</a:t>
+            </a:r>
+          </a:p>
+          <a:p>
+            <a:pPr lvl="1">
+              <a:lnSpc>
+                <a:spcPct val="120000"/>
+              </a:lnSpc>
+            </a:pPr>
+            <a:r>
+              <a:rPr lang="en-US" dirty="0"/>
+              <a:t>W</a:t>
+            </a:r>
+            <a:r>
+              <a:rPr lang="en-US" dirty="0" smtClean="0"/>
+              <a:t>e’re </a:t>
+            </a:r>
+            <a:r>
+              <a:rPr lang="en-US" dirty="0" smtClean="0"/>
+              <a:t>using </a:t>
+            </a:r>
+            <a:r>
+              <a:rPr lang="en-US" dirty="0" smtClean="0">
+                <a:latin typeface="Roboto" pitchFamily="2" charset="0"/>
+                <a:ea typeface="Roboto" pitchFamily="2" charset="0"/>
+              </a:rPr>
+              <a:t>Amazon Elastic Beanstalk</a:t>
+            </a:r>
+            <a:r>
+              <a:rPr lang="en-US" dirty="0" smtClean="0"/>
+              <a:t>. This service will </a:t>
+            </a:r>
+            <a:r>
+              <a:rPr lang="en-US" dirty="0" smtClean="0"/>
+              <a:t>handle </a:t>
+            </a:r>
+            <a:r>
+              <a:rPr lang="en-US" dirty="0" smtClean="0"/>
+              <a:t>load balancing and </a:t>
+            </a:r>
+            <a:r>
+              <a:rPr lang="en-US" dirty="0" smtClean="0"/>
+              <a:t>then automatically increase </a:t>
+            </a:r>
+            <a:r>
+              <a:rPr lang="en-US" dirty="0" smtClean="0"/>
+              <a:t>the servers </a:t>
+            </a:r>
+            <a:r>
+              <a:rPr lang="en-US" dirty="0" smtClean="0"/>
+              <a:t>that we </a:t>
+            </a:r>
+            <a:r>
+              <a:rPr lang="en-US" dirty="0" smtClean="0"/>
+              <a:t>need if necessary</a:t>
+            </a:r>
+          </a:p>
+          <a:p>
+            <a:pPr>
+              <a:lnSpc>
+                <a:spcPct val="120000"/>
+              </a:lnSpc>
+            </a:pPr>
+            <a:r>
+              <a:rPr lang="en-US" dirty="0" err="1" smtClean="0">
+                <a:latin typeface="Roboto" pitchFamily="2" charset="0"/>
+                <a:ea typeface="Roboto" pitchFamily="2" charset="0"/>
+              </a:rPr>
+              <a:t>ActionBarSherlock</a:t>
+            </a:r>
+            <a:r>
+              <a:rPr lang="en-US" dirty="0" smtClean="0"/>
+              <a:t> allows us to have an action bar on devices running a version of Android that predates it being built into the operating system</a:t>
+            </a:r>
+            <a:endParaRPr lang="en-US" dirty="0"/>
+          </a:p>
+        </p:txBody>
+      </p:sp>
+      <p:sp>
+        <p:nvSpPr>
+          <p:cNvPr id="6" name="Text Placeholder 5"/>
+          <p:cNvSpPr>
+            <a:spLocks noGrp="1"/>
+          </p:cNvSpPr>
+          <p:nvPr>
+            <p:ph type="body" sz="quarter" idx="3"/>
+          </p:nvPr>
+        </p:nvSpPr>
+        <p:spPr>
+          <a:xfrm>
+            <a:off x="6629400" y="1871409"/>
+            <a:ext cx="2209800" cy="574675"/>
+          </a:xfrm>
+        </p:spPr>
+        <p:txBody>
+          <a:bodyPr>
+            <a:normAutofit/>
+          </a:bodyPr>
+          <a:lstStyle/>
+          <a:p>
+            <a:pPr algn="ctr"/>
+            <a:r>
+              <a:rPr lang="en-US" b="0" dirty="0" smtClean="0">
+                <a:latin typeface="Roboto" pitchFamily="2" charset="0"/>
+                <a:ea typeface="Roboto" pitchFamily="2" charset="0"/>
+              </a:rPr>
+              <a:t>Action Bar</a:t>
+            </a:r>
+            <a:endParaRPr lang="en-US" b="0" dirty="0">
+              <a:latin typeface="Roboto" pitchFamily="2" charset="0"/>
+              <a:ea typeface="Roboto" pitchFamily="2" charset="0"/>
+            </a:endParaRPr>
+          </a:p>
+        </p:txBody>
+      </p:sp>
+      <p:pic>
+        <p:nvPicPr>
+          <p:cNvPr id="8" name="Content Placeholder 7"/>
+          <p:cNvPicPr>
+            <a:picLocks noGrp="1" noChangeAspect="1"/>
+          </p:cNvPicPr>
+          <p:nvPr>
+            <p:ph sz="quarter" idx="4"/>
+          </p:nvPr>
+        </p:nvPicPr>
+        <p:blipFill>
+          <a:blip r:embed="rId2">
+            <a:extLst>
+              <a:ext uri="{28A0092B-C50C-407E-A947-70E740481C1C}">
+                <a14:useLocalDpi xmlns:a14="http://schemas.microsoft.com/office/drawing/2010/main" val="0"/>
+              </a:ext>
+            </a:extLst>
+          </a:blip>
+          <a:stretch>
+            <a:fillRect/>
+          </a:stretch>
+        </p:blipFill>
+        <p:spPr>
+          <a:xfrm>
+            <a:off x="6705600" y="2438400"/>
+            <a:ext cx="2085351" cy="3701500"/>
+          </a:xfrm>
+          <a:effectLst>
+            <a:outerShdw blurRad="76200" sx="101000" sy="101000" algn="ctr" rotWithShape="0">
+              <a:srgbClr val="535A98">
+                <a:alpha val="52000"/>
+              </a:srgbClr>
+            </a:outerShdw>
+          </a:effectLst>
+        </p:spPr>
+      </p:pic>
+      <p:sp>
+        <p:nvSpPr>
+          <p:cNvPr id="20" name="U-Turn Arrow 19"/>
+          <p:cNvSpPr/>
+          <p:nvPr/>
+        </p:nvSpPr>
+        <p:spPr>
+          <a:xfrm rot="16200000" flipH="1">
+            <a:off x="6134100" y="1950784"/>
+            <a:ext cx="609600" cy="990600"/>
+          </a:xfrm>
+          <a:prstGeom prst="uturnArrow">
+            <a:avLst>
+              <a:gd name="adj1" fmla="val 23348"/>
+              <a:gd name="adj2" fmla="val 25000"/>
+              <a:gd name="adj3" fmla="val 50105"/>
+              <a:gd name="adj4" fmla="val 43750"/>
+              <a:gd name="adj5" fmla="val 67439"/>
+            </a:avLst>
+          </a:prstGeom>
+          <a:noFill/>
+          <a:ln>
+            <a:solidFill>
+              <a:srgbClr val="8A9AA1"/>
+            </a:solidFill>
+          </a:ln>
+          <a:effectLst>
+            <a:outerShdw blurRad="50800" dist="12700" dir="5400000" algn="t" rotWithShape="0">
+              <a:srgbClr val="EF9CBB">
+                <a:alpha val="52000"/>
+              </a:srgbClr>
+            </a:outerShdw>
+          </a:effectLst>
+        </p:spPr>
+        <p:style>
+          <a:lnRef idx="2">
+            <a:schemeClr val="accent1">
+              <a:shade val="50000"/>
+            </a:schemeClr>
+          </a:lnRef>
+          <a:fillRef idx="1">
+            <a:schemeClr val="accent1"/>
+          </a:fillRef>
+          <a:effectRef idx="0">
+            <a:schemeClr val="accent1"/>
+          </a:effectRef>
+          <a:fontRef idx="minor">
+            <a:schemeClr val="lt1"/>
+          </a:fontRef>
+        </p:style>
+        <p:txBody>
+          <a:bodyPr rtlCol="0" anchor="ctr"/>
+          <a:lstStyle/>
+          <a:p>
+            <a:pPr algn="ctr"/>
+            <a:endParaRPr lang="en-US">
+              <a:solidFill>
+                <a:schemeClr val="tx1"/>
+              </a:solidFill>
+            </a:endParaRPr>
+          </a:p>
+        </p:txBody>
+      </p:sp>
+    </p:spTree>
+    <p:extLst>
+      <p:ext uri="{BB962C8B-B14F-4D97-AF65-F5344CB8AC3E}">
+        <p14:creationId xmlns:p14="http://schemas.microsoft.com/office/powerpoint/2010/main" val="2780555695"/>
+      </p:ext>
+    </p:extLst>
+  </p:cSld>
+  <p:clrMapOvr>
+    <a:masterClrMapping/>
+  </p:clrMapOvr>
+  <mc:AlternateContent xmlns:mc="http://schemas.openxmlformats.org/markup-compatibility/2006" xmlns:p14="http://schemas.microsoft.com/office/powerpoint/2010/main">
+    <mc:Choice Requires="p14">
+      <p:transition p14:dur="60">
+        <p:fade/>
+      </p:transition>
+    </mc:Choice>
+    <mc:Fallback xmlns="">
+      <p:transition>
+        <p:fade/>
+      </p:transition>
+    </mc:Fallback>
+  </mc:AlternateContent>
+  <p:timing>
+    <p:tnLst>
+      <p:par>
+        <p:cTn id="1" dur="indefinite" restart="never" nodeType="tmRoot"/>
+      </p:par>
+    </p:tnLst>
+  </p:timing>
+</p:sld>
+</file>
+
+<file path=ppt/slides/slide4.xml><?xml version="1.0" encoding="utf-8"?>
+<p:sld xmlns:a="http://schemas.openxmlformats.org/drawingml/2006/main" xmlns:r="http://schemas.openxmlformats.org/officeDocument/2006/relationships" xmlns:p="http://schemas.openxmlformats.org/presentationml/2006/main">
+  <p:cSld>
+    <p:spTree>
+      <p:nvGrpSpPr>
+        <p:cNvPr id="1" name=""/>
+        <p:cNvGrpSpPr/>
+        <p:nvPr/>
+      </p:nvGrpSpPr>
+      <p:grpSpPr>
+        <a:xfrm>
+          <a:off x="0" y="0"/>
+          <a:ext cx="0" cy="0"/>
+          <a:chOff x="0" y="0"/>
+          <a:chExt cx="0" cy="0"/>
+        </a:xfrm>
+      </p:grpSpPr>
+      <p:sp>
+        <p:nvSpPr>
+          <p:cNvPr id="2" name="Title 1"/>
+          <p:cNvSpPr>
+            <a:spLocks noGrp="1"/>
+          </p:cNvSpPr>
+          <p:nvPr>
+            <p:ph type="title"/>
+          </p:nvPr>
+        </p:nvSpPr>
+        <p:spPr/>
+        <p:txBody>
+          <a:bodyPr/>
+          <a:lstStyle/>
+          <a:p>
+            <a:r>
+              <a:rPr lang="en-US" dirty="0" smtClean="0"/>
+              <a:t>what’s it do?</a:t>
+            </a:r>
+            <a:endParaRPr lang="en-US" dirty="0"/>
+          </a:p>
+        </p:txBody>
+      </p:sp>
+      <p:sp>
+        <p:nvSpPr>
+          <p:cNvPr id="3" name="Content Placeholder 2"/>
+          <p:cNvSpPr>
+            <a:spLocks noGrp="1"/>
+          </p:cNvSpPr>
+          <p:nvPr>
+            <p:ph idx="1"/>
+          </p:nvPr>
+        </p:nvSpPr>
+        <p:spPr>
+          <a:xfrm>
+            <a:off x="457200" y="1600200"/>
+            <a:ext cx="8229600" cy="5257800"/>
+          </a:xfrm>
+        </p:spPr>
+        <p:txBody>
+          <a:bodyPr>
+            <a:normAutofit fontScale="92500" lnSpcReduction="10000"/>
+          </a:bodyPr>
+          <a:lstStyle/>
+          <a:p>
+            <a:r>
+              <a:rPr lang="en-US" dirty="0" smtClean="0"/>
+              <a:t>Users log in through Facebook and can then challenge their Facebook friends to a game of checkers</a:t>
+            </a:r>
+          </a:p>
+          <a:p>
+            <a:r>
+              <a:rPr lang="en-US" dirty="0" smtClean="0"/>
+              <a:t>New moves and games will be sent over either </a:t>
+            </a:r>
+            <a:r>
+              <a:rPr lang="en-US" dirty="0" err="1" smtClean="0"/>
+              <a:t>WiFi</a:t>
+            </a:r>
+            <a:r>
+              <a:rPr lang="en-US" dirty="0" smtClean="0"/>
+              <a:t> or a data connection to our </a:t>
+            </a:r>
+            <a:r>
+              <a:rPr lang="en-US" dirty="0" smtClean="0"/>
+              <a:t>web </a:t>
+            </a:r>
+            <a:r>
+              <a:rPr lang="en-US" dirty="0" smtClean="0"/>
+              <a:t>server to be processed</a:t>
+            </a:r>
+          </a:p>
+          <a:p>
+            <a:pPr lvl="1"/>
+            <a:r>
+              <a:rPr lang="en-US" dirty="0" smtClean="0"/>
+              <a:t>Server will then send a push notification to the receiving user’s phone to alert them of their turn</a:t>
+            </a:r>
+          </a:p>
+          <a:p>
+            <a:pPr lvl="1"/>
+            <a:r>
+              <a:rPr lang="en-US" dirty="0" smtClean="0"/>
+              <a:t>Server also performs </a:t>
+            </a:r>
+            <a:r>
+              <a:rPr lang="en-US" dirty="0" smtClean="0"/>
+              <a:t>validation to prevent cheating</a:t>
+            </a:r>
+          </a:p>
+          <a:p>
+            <a:r>
+              <a:rPr lang="en-US" dirty="0" smtClean="0"/>
+              <a:t>To put it </a:t>
+            </a:r>
+            <a:r>
+              <a:rPr lang="en-US" i="1" dirty="0" smtClean="0"/>
+              <a:t>very</a:t>
+            </a:r>
+            <a:r>
+              <a:rPr lang="en-US" dirty="0" smtClean="0"/>
+              <a:t> simply, take Words with Friends but replace scrabble with checkers</a:t>
+            </a:r>
+            <a:endParaRPr lang="en-US" dirty="0"/>
+          </a:p>
+        </p:txBody>
+      </p:sp>
+    </p:spTree>
+    <p:extLst>
+      <p:ext uri="{BB962C8B-B14F-4D97-AF65-F5344CB8AC3E}">
+        <p14:creationId xmlns:p14="http://schemas.microsoft.com/office/powerpoint/2010/main" val="1097152770"/>
+      </p:ext>
+    </p:extLst>
+  </p:cSld>
+  <p:clrMapOvr>
+    <a:masterClrMapping/>
+  </p:clrMapOvr>
+  <mc:AlternateContent xmlns:mc="http://schemas.openxmlformats.org/markup-compatibility/2006" xmlns:p14="http://schemas.microsoft.com/office/powerpoint/2010/main">
+    <mc:Choice Requires="p14">
+      <p:transition p14:dur="60">
+        <p:fade/>
+      </p:transition>
+    </mc:Choice>
+    <mc:Fallback xmlns="">
+      <p:transition>
+        <p:fade/>
+      </p:transition>
+    </mc:Fallback>
+  </mc:AlternateContent>
+  <p:timing>
+    <p:tnLst>
+      <p:par>
+        <p:cTn id="1" dur="indefinite" restart="never" nodeType="tmRoot"/>
+      </p:par>
+    </p:tnLst>
+  </p:timing>
+</p:sld>
+</file>
+
+<file path=ppt/slides/slide5.xml><?xml version="1.0" encoding="utf-8"?>
+<p:sld xmlns:a="http://schemas.openxmlformats.org/drawingml/2006/main" xmlns:r="http://schemas.openxmlformats.org/officeDocument/2006/relationships" xmlns:p="http://schemas.openxmlformats.org/presentationml/2006/main">
+  <p:cSld>
+    <p:spTree>
+      <p:nvGrpSpPr>
+        <p:cNvPr id="1" name=""/>
+        <p:cNvGrpSpPr/>
+        <p:nvPr/>
+      </p:nvGrpSpPr>
+      <p:grpSpPr>
+        <a:xfrm>
+          <a:off x="0" y="0"/>
+          <a:ext cx="0" cy="0"/>
+          <a:chOff x="0" y="0"/>
+          <a:chExt cx="0" cy="0"/>
+        </a:xfrm>
+      </p:grpSpPr>
+      <p:sp>
+        <p:nvSpPr>
+          <p:cNvPr id="2" name="Title 1"/>
+          <p:cNvSpPr>
+            <a:spLocks noGrp="1"/>
+          </p:cNvSpPr>
+          <p:nvPr>
+            <p:ph type="title"/>
+          </p:nvPr>
+        </p:nvSpPr>
+        <p:spPr/>
+        <p:txBody>
+          <a:bodyPr/>
+          <a:lstStyle/>
+          <a:p>
+            <a:r>
+              <a:rPr lang="en-US" dirty="0" smtClean="0"/>
+              <a:t>questions?</a:t>
+            </a:r>
+            <a:endParaRPr lang="en-US" dirty="0"/>
+          </a:p>
+        </p:txBody>
+      </p:sp>
+    </p:spTree>
+    <p:extLst>
+      <p:ext uri="{BB962C8B-B14F-4D97-AF65-F5344CB8AC3E}">
+        <p14:creationId xmlns:p14="http://schemas.microsoft.com/office/powerpoint/2010/main" val="2757940110"/>
+      </p:ext>
+    </p:extLst>
+  </p:cSld>
+  <p:clrMapOvr>
+    <a:masterClrMapping/>
+  </p:clrMapOvr>
+  <mc:AlternateContent xmlns:mc="http://schemas.openxmlformats.org/markup-compatibility/2006" xmlns:p14="http://schemas.microsoft.com/office/powerpoint/2010/main">
+    <mc:Choice Requires="p14">
+      <p:transition p14:dur="60">
+        <p:fade/>
+      </p:transition>
+    </mc:Choice>
+    <mc:Fallback xmlns="">
+      <p:transition>
+        <p:fade/>
+      </p:transition>
+    </mc:Fallback>
+  </mc:AlternateContent>
+  <p:timing>
+    <p:tnLst>
+      <p:par>
+        <p:cTn id="1" dur="indefinite" restart="never" nodeType="tmRoot"/>
+      </p:par>
+    </p:tnLst>
+  </p:timing>
 </p:sld>
 </file>
 
 <file path=ppt/theme/theme1.xml><?xml version="1.0" encoding="utf-8"?>
+<a:theme xmlns:a="http://schemas.openxmlformats.org/drawingml/2006/main" name="PresentationTemplate">
+  <a:themeElements>
+    <a:clrScheme name="Office">
+      <a:dk1>
+        <a:sysClr val="windowText" lastClr="000000"/>
+      </a:dk1>
+      <a:lt1>
+        <a:sysClr val="window" lastClr="FFFFFF"/>
+      </a:lt1>
+      <a:dk2>
+        <a:srgbClr val="1F497D"/>
+      </a:dk2>
+      <a:lt2>
+        <a:srgbClr val="EEECE1"/>
+      </a:lt2>
+      <a:accent1>
+        <a:srgbClr val="4F81BD"/>
+      </a:accent1>
+      <a:accent2>
+        <a:srgbClr val="C0504D"/>
+      </a:accent2>
+      <a:accent3>
+        <a:srgbClr val="9BBB59"/>
+      </a:accent3>
+      <a:accent4>
+        <a:srgbClr val="8064A2"/>
+      </a:accent4>
+      <a:accent5>
+        <a:srgbClr val="4BACC6"/>
+      </a:accent5>
+      <a:accent6>
+        <a:srgbClr val="F79646"/>
+      </a:accent6>
+      <a:hlink>
+        <a:srgbClr val="0000FF"/>
+      </a:hlink>
+      <a:folHlink>
+        <a:srgbClr val="800080"/>
+      </a:folHlink>
+    </a:clrScheme>
+    <a:fontScheme name="Office">
+      <a:majorFont>
+        <a:latin typeface="Calibri"/>
+        <a:ea typeface=""/>
+        <a:cs typeface=""/>
+        <a:font script="Jpan" typeface="ＭＳ Ｐゴシック"/>
+        <a:font script="Hang" typeface="맑은 고딕"/>
+        <a:font script="Hans" typeface="宋体"/>
+        <a:font script="Hant" typeface="新細明體"/>
+        <a:font script="Arab" typeface="Times New Roman"/>
+        <a:font script="Hebr" typeface="Times New Roman"/>
+        <a:font script="Thai" typeface="Angsana New"/>
+        <a:font script="Ethi" typeface="Nyala"/>
+        <a:font script="Beng" typeface="Vrinda"/>
+        <a:font script="Gujr" typeface="Shruti"/>
+        <a:font script="Khmr" typeface="MoolBoran"/>
+        <a:font script="Knda" typeface="Tunga"/>
+        <a:font script="Guru" typeface="Raavi"/>
+        <a:font script="Cans" typeface="Euphemia"/>
+        <a:font script="Cher" typeface="Plantagenet Cherokee"/>
+        <a:font script="Yiii" typeface="Microsoft Yi Baiti"/>
+        <a:font script="Tibt" typeface="Microsoft Himalaya"/>
+        <a:font script="Thaa" typeface="MV Boli"/>
+        <a:font script="Deva" typeface="Mangal"/>
+        <a:font script="Telu" typeface="Gautami"/>
+        <a:font script="Taml" typeface="Latha"/>
+        <a:font script="Syrc" typeface="Estrangelo Edessa"/>
+        <a:font script="Orya" typeface="Kalinga"/>
+        <a:font script="Mlym" typeface="Kartika"/>
+        <a:font script="Laoo" typeface="DokChampa"/>
+        <a:font script="Sinh" typeface="Iskoola Pota"/>
+        <a:font script="Mong" typeface="Mongolian Baiti"/>
+        <a:font script="Viet" typeface="Times New Roman"/>
+        <a:font script="Uigh" typeface="Microsoft Uighur"/>
+        <a:font script="Geor" typeface="Sylfaen"/>
+      </a:majorFont>
+      <a:minorFont>
+        <a:latin typeface="Calibri"/>
+        <a:ea typeface=""/>
+        <a:cs typeface=""/>
+        <a:font script="Jpan" typeface="ＭＳ Ｐゴシック"/>
+        <a:font script="Hang" typeface="맑은 고딕"/>
+        <a:font script="Hans" typeface="宋体"/>
+        <a:font script="Hant" typeface="新細明體"/>
+        <a:font script="Arab" typeface="Arial"/>
+        <a:font script="Hebr" typeface="Arial"/>
+        <a:font script="Thai" typeface="Cordia New"/>
+        <a:font script="Ethi" typeface="Nyala"/>
+        <a:font script="Beng" typeface="Vrinda"/>
+        <a:font script="Gujr" typeface="Shruti"/>
+        <a:font script="Khmr" typeface="DaunPenh"/>
+        <a:font script="Knda" typeface="Tunga"/>
+        <a:font script="Guru" typeface="Raavi"/>
+        <a:font script="Cans" typeface="Euphemia"/>
+        <a:font script="Cher" typeface="Plantagenet Cherokee"/>
+        <a:font script="Yiii" typeface="Microsoft Yi Baiti"/>
+        <a:font script="Tibt" typeface="Microsoft Himalaya"/>
+        <a:font script="Thaa" typeface="MV Boli"/>
+        <a:font script="Deva" typeface="Mangal"/>
+        <a:font script="Telu" typeface="Gautami"/>
+        <a:font script="Taml" typeface="Latha"/>
+        <a:font script="Syrc" typeface="Estrangelo Edessa"/>
+        <a:font script="Orya" typeface="Kalinga"/>
+        <a:font script="Mlym" typeface="Kartika"/>
+        <a:font script="Laoo" typeface="DokChampa"/>
+        <a:font script="Sinh" typeface="Iskoola Pota"/>
+        <a:font script="Mong" typeface="Mongolian Baiti"/>
+        <a:font script="Viet" typeface="Arial"/>
+        <a:font script="Uigh" typeface="Microsoft Uighur"/>
+        <a:font script="Geor" typeface="Sylfaen"/>
+      </a:minorFont>
+    </a:fontScheme>
+    <a:fmtScheme name="Office">
+      <a:fillStyleLst>
+        <a:solidFill>
+          <a:schemeClr val="phClr"/>
+        </a:solidFill>
+        <a:gradFill rotWithShape="1">
+          <a:gsLst>
+            <a:gs pos="0">
+              <a:schemeClr val="phClr">
+                <a:tint val="50000"/>
+                <a:satMod val="300000"/>
+              </a:schemeClr>
+            </a:gs>
+            <a:gs pos="35000">
+              <a:schemeClr val="phClr">
+                <a:tint val="37000"/>
+                <a:satMod val="300000"/>
+              </a:schemeClr>
+            </a:gs>
+            <a:gs pos="100000">
+              <a:schemeClr val="phClr">
+                <a:tint val="15000"/>
+                <a:satMod val="350000"/>
+              </a:schemeClr>
+            </a:gs>
+          </a:gsLst>
+          <a:lin ang="16200000" scaled="1"/>
+        </a:gradFill>
+        <a:gradFill rotWithShape="1">
+          <a:gsLst>
+            <a:gs pos="0">
+              <a:schemeClr val="phClr">
+                <a:shade val="51000"/>
+                <a:satMod val="130000"/>
+              </a:schemeClr>
+            </a:gs>
+            <a:gs pos="80000">
+              <a:schemeClr val="phClr">
+                <a:shade val="93000"/>
+                <a:satMod val="130000"/>
+              </a:schemeClr>
+            </a:gs>
+            <a:gs pos="100000">
+              <a:schemeClr val="phClr">
+                <a:shade val="94000"/>
+                <a:satMod val="135000"/>
+              </a:schemeClr>
+            </a:gs>
+          </a:gsLst>
+          <a:lin ang="16200000" scaled="0"/>
+        </a:gradFill>
+      </a:fillStyleLst>
+      <a:lnStyleLst>
+        <a:ln w="9525" cap="flat" cmpd="sng" algn="ctr">
+          <a:solidFill>
+            <a:schemeClr val="phClr">
+              <a:shade val="95000"/>
+              <a:satMod val="105000"/>
+            </a:schemeClr>
+          </a:solidFill>
+          <a:prstDash val="solid"/>
+        </a:ln>
+        <a:ln w="25400" cap="flat" cmpd="sng" algn="ctr">
+          <a:solidFill>
+            <a:schemeClr val="phClr"/>
+          </a:solidFill>
+          <a:prstDash val="solid"/>
+        </a:ln>
+        <a:ln w="38100" cap="flat" cmpd="sng" algn="ctr">
+          <a:solidFill>
+            <a:schemeClr val="phClr"/>
+          </a:solidFill>
+          <a:prstDash val="solid"/>
+        </a:ln>
+      </a:lnStyleLst>
+      <a:effectStyleLst>
+        <a:effectStyle>
+          <a:effectLst>
+            <a:outerShdw blurRad="40000" dist="20000" dir="5400000" rotWithShape="0">
+              <a:srgbClr val="000000">
+                <a:alpha val="38000"/>
+              </a:srgbClr>
+            </a:outerShdw>
+          </a:effectLst>
+        </a:effectStyle>
+        <a:effectStyle>
+          <a:effectLst>
+            <a:outerShdw blurRad="40000" dist="23000" dir="5400000" rotWithShape="0">
+              <a:srgbClr val="000000">
+                <a:alpha val="35000"/>
+              </a:srgbClr>
+            </a:outerShdw>
+          </a:effectLst>
+        </a:effectStyle>
+        <a:effectStyle>
+          <a:effectLst>
+            <a:outerShdw blurRad="40000" dist="23000" dir="5400000" rotWithShape="0">
+              <a:srgbClr val="000000">
+                <a:alpha val="35000"/>
+              </a:srgbClr>
+            </a:outerShdw>
+          </a:effectLst>
+          <a:scene3d>
+            <a:camera prst="orthographicFront">
+              <a:rot lat="0" lon="0" rev="0"/>
+            </a:camera>
+            <a:lightRig rig="threePt" dir="t">
+              <a:rot lat="0" lon="0" rev="1200000"/>
+            </a:lightRig>
+          </a:scene3d>
+          <a:sp3d>
+            <a:bevelT w="63500" h="25400"/>
+          </a:sp3d>
+        </a:effectStyle>
+      </a:effectStyleLst>
+      <a:bgFillStyleLst>
+        <a:solidFill>
+          <a:schemeClr val="phClr"/>
+        </a:solidFill>
+        <a:gradFill rotWithShape="1">
+          <a:gsLst>
+            <a:gs pos="0">
+              <a:schemeClr val="phClr">
+                <a:tint val="40000"/>
+                <a:satMod val="350000"/>
+              </a:schemeClr>
+            </a:gs>
+            <a:gs pos="40000">
+              <a:schemeClr val="phClr">
+                <a:tint val="45000"/>
+                <a:shade val="99000"/>
+                <a:satMod val="350000"/>
+              </a:schemeClr>
+            </a:gs>
+            <a:gs pos="100000">
+              <a:schemeClr val="phClr">
+                <a:shade val="20000"/>
+                <a:satMod val="255000"/>
+              </a:schemeClr>
+            </a:gs>
+          </a:gsLst>
+          <a:path path="circle">
+            <a:fillToRect l="50000" t="-80000" r="50000" b="180000"/>
+          </a:path>
+        </a:gradFill>
+        <a:gradFill rotWithShape="1">
+          <a:gsLst>
+            <a:gs pos="0">
+              <a:schemeClr val="phClr">
+                <a:tint val="80000"/>
+                <a:satMod val="300000"/>
+              </a:schemeClr>
+            </a:gs>
+            <a:gs pos="100000">
+              <a:schemeClr val="phClr">
+                <a:shade val="30000"/>
+                <a:satMod val="200000"/>
+              </a:schemeClr>
+            </a:gs>
+          </a:gsLst>
+          <a:path path="circle">
+            <a:fillToRect l="50000" t="50000" r="50000" b="50000"/>
+          </a:path>
+        </a:gradFill>
+      </a:bgFillStyleLst>
+    </a:fmtScheme>
+  </a:themeElements>
+  <a:objectDefaults/>
+  <a:extraClrSchemeLst/>
+</a:theme>
+</file>
+
+<file path=ppt/theme/theme2.xml><?xml version="1.0" encoding="utf-8"?>
 <a:theme xmlns:a="http://schemas.openxmlformats.org/drawingml/2006/main" name="Office Theme">
   <a:themeElements>
     <a:clrScheme name="Office">

</xml_diff>